<commit_message>
_docs and README.md for cks-configurator
</commit_message>
<xml_diff>
--- a/_docs/CodeKickStart.pptx
+++ b/_docs/CodeKickStart.pptx
@@ -5,7 +5,7 @@
     <p:sldMasterId id="2147483648" r:id="rId1"/>
   </p:sldMasterIdLst>
   <p:notesMasterIdLst>
-    <p:notesMasterId r:id="rId15"/>
+    <p:notesMasterId r:id="rId16"/>
   </p:notesMasterIdLst>
   <p:sldIdLst>
     <p:sldId id="256" r:id="rId2"/>
@@ -21,6 +21,7 @@
     <p:sldId id="278" r:id="rId12"/>
     <p:sldId id="280" r:id="rId13"/>
     <p:sldId id="281" r:id="rId14"/>
+    <p:sldId id="282" r:id="rId15"/>
   </p:sldIdLst>
   <p:sldSz cx="12192000" cy="6858000"/>
   <p:notesSz cx="6858000" cy="9144000"/>
@@ -209,7 +210,7 @@
           <a:p>
             <a:fld id="{DB3CD4F8-8AC4-4145-A936-7F01B490307F}" type="datetimeFigureOut">
               <a:rPr lang="en-US" smtClean="0"/>
-              <a:t>1/8/24</a:t>
+              <a:t>4/14/24</a:t>
             </a:fld>
             <a:endParaRPr lang="en-US"/>
           </a:p>
@@ -812,6 +813,90 @@
 </p:notes>
 </file>
 
+<file path=ppt/notesSlides/notesSlide5.xml><?xml version="1.0" encoding="utf-8"?>
+<p:notes xmlns:a="http://schemas.openxmlformats.org/drawingml/2006/main" xmlns:r="http://schemas.openxmlformats.org/officeDocument/2006/relationships" xmlns:p="http://schemas.openxmlformats.org/presentationml/2006/main">
+  <p:cSld>
+    <p:spTree>
+      <p:nvGrpSpPr>
+        <p:cNvPr id="1" name=""/>
+        <p:cNvGrpSpPr/>
+        <p:nvPr/>
+      </p:nvGrpSpPr>
+      <p:grpSpPr>
+        <a:xfrm>
+          <a:off x="0" y="0"/>
+          <a:ext cx="0" cy="0"/>
+          <a:chOff x="0" y="0"/>
+          <a:chExt cx="0" cy="0"/>
+        </a:xfrm>
+      </p:grpSpPr>
+      <p:sp>
+        <p:nvSpPr>
+          <p:cNvPr id="2" name="Slide Image Placeholder 1"/>
+          <p:cNvSpPr>
+            <a:spLocks noGrp="1" noRot="1" noChangeAspect="1"/>
+          </p:cNvSpPr>
+          <p:nvPr>
+            <p:ph type="sldImg"/>
+          </p:nvPr>
+        </p:nvSpPr>
+        <p:spPr/>
+      </p:sp>
+      <p:sp>
+        <p:nvSpPr>
+          <p:cNvPr id="3" name="Notes Placeholder 2"/>
+          <p:cNvSpPr>
+            <a:spLocks noGrp="1"/>
+          </p:cNvSpPr>
+          <p:nvPr>
+            <p:ph type="body" idx="1"/>
+          </p:nvPr>
+        </p:nvSpPr>
+        <p:spPr/>
+        <p:txBody>
+          <a:bodyPr/>
+          <a:lstStyle/>
+          <a:p>
+            <a:endParaRPr lang="en-US" dirty="0"/>
+          </a:p>
+        </p:txBody>
+      </p:sp>
+      <p:sp>
+        <p:nvSpPr>
+          <p:cNvPr id="4" name="Slide Number Placeholder 3"/>
+          <p:cNvSpPr>
+            <a:spLocks noGrp="1"/>
+          </p:cNvSpPr>
+          <p:nvPr>
+            <p:ph type="sldNum" sz="quarter" idx="5"/>
+          </p:nvPr>
+        </p:nvSpPr>
+        <p:spPr/>
+        <p:txBody>
+          <a:bodyPr/>
+          <a:lstStyle/>
+          <a:p>
+            <a:fld id="{F7912FA9-B3DA-0546-8E1C-4A436CF31558}" type="slidenum">
+              <a:rPr lang="en-US" smtClean="0"/>
+              <a:t>14</a:t>
+            </a:fld>
+            <a:endParaRPr lang="en-US"/>
+          </a:p>
+        </p:txBody>
+      </p:sp>
+    </p:spTree>
+    <p:extLst>
+      <p:ext uri="{BB962C8B-B14F-4D97-AF65-F5344CB8AC3E}">
+        <p14:creationId xmlns:p14="http://schemas.microsoft.com/office/powerpoint/2010/main" val="2570136082"/>
+      </p:ext>
+    </p:extLst>
+  </p:cSld>
+  <p:clrMapOvr>
+    <a:masterClrMapping/>
+  </p:clrMapOvr>
+</p:notes>
+</file>
+
 <file path=ppt/slideLayouts/slideLayout1.xml><?xml version="1.0" encoding="utf-8"?>
 <p:sldLayout xmlns:a="http://schemas.openxmlformats.org/drawingml/2006/main" xmlns:r="http://schemas.openxmlformats.org/officeDocument/2006/relationships" xmlns:p="http://schemas.openxmlformats.org/presentationml/2006/main" type="title" preserve="1">
   <p:cSld name="Title Slide">
@@ -961,7 +1046,7 @@
           <a:p>
             <a:fld id="{4853C822-927B-4242-A6B0-4C38D92BBD62}" type="datetimeFigureOut">
               <a:rPr lang="en-US" smtClean="0"/>
-              <a:t>1/8/24</a:t>
+              <a:t>4/14/24</a:t>
             </a:fld>
             <a:endParaRPr lang="en-US"/>
           </a:p>
@@ -1159,7 +1244,7 @@
           <a:p>
             <a:fld id="{4853C822-927B-4242-A6B0-4C38D92BBD62}" type="datetimeFigureOut">
               <a:rPr lang="en-US" smtClean="0"/>
-              <a:t>1/8/24</a:t>
+              <a:t>4/14/24</a:t>
             </a:fld>
             <a:endParaRPr lang="en-US"/>
           </a:p>
@@ -1367,7 +1452,7 @@
           <a:p>
             <a:fld id="{4853C822-927B-4242-A6B0-4C38D92BBD62}" type="datetimeFigureOut">
               <a:rPr lang="en-US" smtClean="0"/>
-              <a:t>1/8/24</a:t>
+              <a:t>4/14/24</a:t>
             </a:fld>
             <a:endParaRPr lang="en-US"/>
           </a:p>
@@ -1599,7 +1684,7 @@
           <a:p>
             <a:fld id="{4853C822-927B-4242-A6B0-4C38D92BBD62}" type="datetimeFigureOut">
               <a:rPr lang="en-US" smtClean="0"/>
-              <a:t>1/8/24</a:t>
+              <a:t>4/14/24</a:t>
             </a:fld>
             <a:endParaRPr lang="en-US"/>
           </a:p>
@@ -1874,7 +1959,7 @@
           <a:p>
             <a:fld id="{4853C822-927B-4242-A6B0-4C38D92BBD62}" type="datetimeFigureOut">
               <a:rPr lang="en-US" smtClean="0"/>
-              <a:t>1/8/24</a:t>
+              <a:t>4/14/24</a:t>
             </a:fld>
             <a:endParaRPr lang="en-US"/>
           </a:p>
@@ -2139,7 +2224,7 @@
           <a:p>
             <a:fld id="{4853C822-927B-4242-A6B0-4C38D92BBD62}" type="datetimeFigureOut">
               <a:rPr lang="en-US" smtClean="0"/>
-              <a:t>1/8/24</a:t>
+              <a:t>4/14/24</a:t>
             </a:fld>
             <a:endParaRPr lang="en-US"/>
           </a:p>
@@ -2551,7 +2636,7 @@
           <a:p>
             <a:fld id="{4853C822-927B-4242-A6B0-4C38D92BBD62}" type="datetimeFigureOut">
               <a:rPr lang="en-US" smtClean="0"/>
-              <a:t>1/8/24</a:t>
+              <a:t>4/14/24</a:t>
             </a:fld>
             <a:endParaRPr lang="en-US"/>
           </a:p>
@@ -2692,7 +2777,7 @@
           <a:p>
             <a:fld id="{4853C822-927B-4242-A6B0-4C38D92BBD62}" type="datetimeFigureOut">
               <a:rPr lang="en-US" smtClean="0"/>
-              <a:t>1/8/24</a:t>
+              <a:t>4/14/24</a:t>
             </a:fld>
             <a:endParaRPr lang="en-US"/>
           </a:p>
@@ -2805,7 +2890,7 @@
           <a:p>
             <a:fld id="{4853C822-927B-4242-A6B0-4C38D92BBD62}" type="datetimeFigureOut">
               <a:rPr lang="en-US" smtClean="0"/>
-              <a:t>1/8/24</a:t>
+              <a:t>4/14/24</a:t>
             </a:fld>
             <a:endParaRPr lang="en-US"/>
           </a:p>
@@ -3116,7 +3201,7 @@
           <a:p>
             <a:fld id="{4853C822-927B-4242-A6B0-4C38D92BBD62}" type="datetimeFigureOut">
               <a:rPr lang="en-US" smtClean="0"/>
-              <a:t>1/8/24</a:t>
+              <a:t>4/14/24</a:t>
             </a:fld>
             <a:endParaRPr lang="en-US"/>
           </a:p>
@@ -3404,7 +3489,7 @@
           <a:p>
             <a:fld id="{4853C822-927B-4242-A6B0-4C38D92BBD62}" type="datetimeFigureOut">
               <a:rPr lang="en-US" smtClean="0"/>
-              <a:t>1/8/24</a:t>
+              <a:t>4/14/24</a:t>
             </a:fld>
             <a:endParaRPr lang="en-US"/>
           </a:p>
@@ -3645,7 +3730,7 @@
           <a:p>
             <a:fld id="{4853C822-927B-4242-A6B0-4C38D92BBD62}" type="datetimeFigureOut">
               <a:rPr lang="en-US" smtClean="0"/>
-              <a:t>1/8/24</a:t>
+              <a:t>4/14/24</a:t>
             </a:fld>
             <a:endParaRPr lang="en-US"/>
           </a:p>
@@ -6369,13 +6454,7 @@
           <p:nvPr/>
         </p:nvPicPr>
         <p:blipFill>
-          <a:blip r:embed="rId5">
-            <a:extLst>
-              <a:ext uri="{96DAC541-7B7A-43D3-8B79-37D633B846F1}">
-                <asvg:svgBlip xmlns:asvg="http://schemas.microsoft.com/office/drawing/2016/SVG/main"/>
-              </a:ext>
-            </a:extLst>
-          </a:blip>
+          <a:blip/>
           <a:stretch>
             <a:fillRect/>
           </a:stretch>
@@ -7542,7 +7621,12 @@
             <p:ph type="title"/>
           </p:nvPr>
         </p:nvSpPr>
-        <p:spPr/>
+        <p:spPr>
+          <a:xfrm>
+            <a:off x="810188" y="302268"/>
+            <a:ext cx="10515600" cy="728179"/>
+          </a:xfrm>
+        </p:spPr>
         <p:txBody>
           <a:bodyPr/>
           <a:lstStyle/>
@@ -8918,6 +9002,2673 @@
 </p:sld>
 </file>
 
+<file path=ppt/slides/slide14.xml><?xml version="1.0" encoding="utf-8"?>
+<p:sld xmlns:a="http://schemas.openxmlformats.org/drawingml/2006/main" xmlns:r="http://schemas.openxmlformats.org/officeDocument/2006/relationships" xmlns:p="http://schemas.openxmlformats.org/presentationml/2006/main">
+  <p:cSld>
+    <p:spTree>
+      <p:nvGrpSpPr>
+        <p:cNvPr id="1" name=""/>
+        <p:cNvGrpSpPr/>
+        <p:nvPr/>
+      </p:nvGrpSpPr>
+      <p:grpSpPr>
+        <a:xfrm>
+          <a:off x="0" y="0"/>
+          <a:ext cx="0" cy="0"/>
+          <a:chOff x="0" y="0"/>
+          <a:chExt cx="0" cy="0"/>
+        </a:xfrm>
+      </p:grpSpPr>
+      <p:sp>
+        <p:nvSpPr>
+          <p:cNvPr id="2" name="Title 1">
+            <a:extLst>
+              <a:ext uri="{FF2B5EF4-FFF2-40B4-BE49-F238E27FC236}">
+                <a16:creationId xmlns:a16="http://schemas.microsoft.com/office/drawing/2014/main" id="{35E97BA4-A5AB-0603-AD73-4CC74859A05F}"/>
+              </a:ext>
+            </a:extLst>
+          </p:cNvPr>
+          <p:cNvSpPr>
+            <a:spLocks noGrp="1"/>
+          </p:cNvSpPr>
+          <p:nvPr>
+            <p:ph type="title"/>
+          </p:nvPr>
+        </p:nvSpPr>
+        <p:spPr>
+          <a:xfrm>
+            <a:off x="838200" y="398654"/>
+            <a:ext cx="10515600" cy="728179"/>
+          </a:xfrm>
+        </p:spPr>
+        <p:txBody>
+          <a:bodyPr/>
+          <a:lstStyle/>
+          <a:p>
+            <a:r>
+              <a:rPr lang="en-US" dirty="0"/>
+              <a:t>cks-kit-repo</a:t>
+            </a:r>
+            <a:endParaRPr lang="en-US" b="1" dirty="0">
+              <a:solidFill>
+                <a:schemeClr val="accent1">
+                  <a:lumMod val="75000"/>
+                </a:schemeClr>
+              </a:solidFill>
+            </a:endParaRPr>
+          </a:p>
+        </p:txBody>
+      </p:sp>
+      <p:sp>
+        <p:nvSpPr>
+          <p:cNvPr id="4" name="Rectangle 3">
+            <a:extLst>
+              <a:ext uri="{FF2B5EF4-FFF2-40B4-BE49-F238E27FC236}">
+                <a16:creationId xmlns:a16="http://schemas.microsoft.com/office/drawing/2014/main" id="{8E07C93A-C8F5-3A6C-138A-7FE925FE51D5}"/>
+              </a:ext>
+            </a:extLst>
+          </p:cNvPr>
+          <p:cNvSpPr/>
+          <p:nvPr/>
+        </p:nvSpPr>
+        <p:spPr>
+          <a:xfrm>
+            <a:off x="993913" y="1324303"/>
+            <a:ext cx="10515600" cy="613827"/>
+          </a:xfrm>
+          <a:prstGeom prst="rect">
+            <a:avLst/>
+          </a:prstGeom>
+          <a:solidFill>
+            <a:schemeClr val="bg1"/>
+          </a:solidFill>
+        </p:spPr>
+        <p:style>
+          <a:lnRef idx="2">
+            <a:schemeClr val="accent1">
+              <a:shade val="15000"/>
+            </a:schemeClr>
+          </a:lnRef>
+          <a:fillRef idx="1">
+            <a:schemeClr val="accent1"/>
+          </a:fillRef>
+          <a:effectRef idx="0">
+            <a:schemeClr val="accent1"/>
+          </a:effectRef>
+          <a:fontRef idx="minor">
+            <a:schemeClr val="lt1"/>
+          </a:fontRef>
+        </p:style>
+        <p:txBody>
+          <a:bodyPr rtlCol="0" anchor="ctr"/>
+          <a:lstStyle/>
+          <a:p>
+            <a:pPr algn="ctr"/>
+            <a:endParaRPr lang="en-US" sz="1400"/>
+          </a:p>
+        </p:txBody>
+      </p:sp>
+      <p:sp>
+        <p:nvSpPr>
+          <p:cNvPr id="5" name="Rectangle 4">
+            <a:extLst>
+              <a:ext uri="{FF2B5EF4-FFF2-40B4-BE49-F238E27FC236}">
+                <a16:creationId xmlns:a16="http://schemas.microsoft.com/office/drawing/2014/main" id="{9186F810-AA1D-54F4-0A66-D5B86E44B5FF}"/>
+              </a:ext>
+            </a:extLst>
+          </p:cNvPr>
+          <p:cNvSpPr/>
+          <p:nvPr/>
+        </p:nvSpPr>
+        <p:spPr>
+          <a:xfrm>
+            <a:off x="1115811" y="1401418"/>
+            <a:ext cx="983861" cy="451488"/>
+          </a:xfrm>
+          <a:prstGeom prst="rect">
+            <a:avLst/>
+          </a:prstGeom>
+          <a:solidFill>
+            <a:schemeClr val="bg1"/>
+          </a:solidFill>
+        </p:spPr>
+        <p:style>
+          <a:lnRef idx="2">
+            <a:schemeClr val="accent1">
+              <a:shade val="15000"/>
+            </a:schemeClr>
+          </a:lnRef>
+          <a:fillRef idx="1">
+            <a:schemeClr val="accent1"/>
+          </a:fillRef>
+          <a:effectRef idx="0">
+            <a:schemeClr val="accent1"/>
+          </a:effectRef>
+          <a:fontRef idx="minor">
+            <a:schemeClr val="lt1"/>
+          </a:fontRef>
+        </p:style>
+        <p:txBody>
+          <a:bodyPr rtlCol="0" anchor="ctr"/>
+          <a:lstStyle/>
+          <a:p>
+            <a:pPr algn="ctr"/>
+            <a:r>
+              <a:rPr lang="en-US" sz="1400" dirty="0">
+                <a:solidFill>
+                  <a:schemeClr val="tx1"/>
+                </a:solidFill>
+              </a:rPr>
+              <a:t>&lt;cks logo&gt;</a:t>
+            </a:r>
+          </a:p>
+        </p:txBody>
+      </p:sp>
+      <p:sp>
+        <p:nvSpPr>
+          <p:cNvPr id="7" name="Rounded Rectangle 6">
+            <a:extLst>
+              <a:ext uri="{FF2B5EF4-FFF2-40B4-BE49-F238E27FC236}">
+                <a16:creationId xmlns:a16="http://schemas.microsoft.com/office/drawing/2014/main" id="{52B4CEAF-5A60-ACCA-CB5A-31CF0D623D75}"/>
+              </a:ext>
+            </a:extLst>
+          </p:cNvPr>
+          <p:cNvSpPr/>
+          <p:nvPr/>
+        </p:nvSpPr>
+        <p:spPr>
+          <a:xfrm>
+            <a:off x="9181575" y="1497952"/>
+            <a:ext cx="983861" cy="271214"/>
+          </a:xfrm>
+          <a:prstGeom prst="roundRect">
+            <a:avLst/>
+          </a:prstGeom>
+          <a:solidFill>
+            <a:schemeClr val="bg1"/>
+          </a:solidFill>
+        </p:spPr>
+        <p:style>
+          <a:lnRef idx="2">
+            <a:schemeClr val="accent1">
+              <a:shade val="15000"/>
+            </a:schemeClr>
+          </a:lnRef>
+          <a:fillRef idx="1">
+            <a:schemeClr val="accent1"/>
+          </a:fillRef>
+          <a:effectRef idx="0">
+            <a:schemeClr val="accent1"/>
+          </a:effectRef>
+          <a:fontRef idx="minor">
+            <a:schemeClr val="lt1"/>
+          </a:fontRef>
+        </p:style>
+        <p:txBody>
+          <a:bodyPr rtlCol="0" anchor="ctr"/>
+          <a:lstStyle/>
+          <a:p>
+            <a:pPr algn="ctr"/>
+            <a:r>
+              <a:rPr lang="en-US" sz="1400" dirty="0">
+                <a:solidFill>
+                  <a:schemeClr val="bg1">
+                    <a:lumMod val="65000"/>
+                  </a:schemeClr>
+                </a:solidFill>
+              </a:rPr>
+              <a:t>Sign Up</a:t>
+            </a:r>
+          </a:p>
+        </p:txBody>
+      </p:sp>
+      <p:sp>
+        <p:nvSpPr>
+          <p:cNvPr id="9" name="Rounded Rectangle 8">
+            <a:extLst>
+              <a:ext uri="{FF2B5EF4-FFF2-40B4-BE49-F238E27FC236}">
+                <a16:creationId xmlns:a16="http://schemas.microsoft.com/office/drawing/2014/main" id="{4E8B1EE7-7162-0A2D-6880-33AE2D333C1B}"/>
+              </a:ext>
+            </a:extLst>
+          </p:cNvPr>
+          <p:cNvSpPr/>
+          <p:nvPr/>
+        </p:nvSpPr>
+        <p:spPr>
+          <a:xfrm>
+            <a:off x="8049509" y="1497952"/>
+            <a:ext cx="983861" cy="271213"/>
+          </a:xfrm>
+          <a:prstGeom prst="roundRect">
+            <a:avLst/>
+          </a:prstGeom>
+          <a:solidFill>
+            <a:schemeClr val="bg1"/>
+          </a:solidFill>
+        </p:spPr>
+        <p:style>
+          <a:lnRef idx="2">
+            <a:schemeClr val="accent1">
+              <a:shade val="15000"/>
+            </a:schemeClr>
+          </a:lnRef>
+          <a:fillRef idx="1">
+            <a:schemeClr val="accent1"/>
+          </a:fillRef>
+          <a:effectRef idx="0">
+            <a:schemeClr val="accent1"/>
+          </a:effectRef>
+          <a:fontRef idx="minor">
+            <a:schemeClr val="lt1"/>
+          </a:fontRef>
+        </p:style>
+        <p:txBody>
+          <a:bodyPr rtlCol="0" anchor="ctr"/>
+          <a:lstStyle/>
+          <a:p>
+            <a:pPr algn="ctr"/>
+            <a:r>
+              <a:rPr lang="en-US" sz="1400" dirty="0">
+                <a:solidFill>
+                  <a:schemeClr val="bg1">
+                    <a:lumMod val="65000"/>
+                  </a:schemeClr>
+                </a:solidFill>
+              </a:rPr>
+              <a:t>Sign In</a:t>
+            </a:r>
+          </a:p>
+        </p:txBody>
+      </p:sp>
+      <p:sp>
+        <p:nvSpPr>
+          <p:cNvPr id="13" name="Rectangle 12">
+            <a:extLst>
+              <a:ext uri="{FF2B5EF4-FFF2-40B4-BE49-F238E27FC236}">
+                <a16:creationId xmlns:a16="http://schemas.microsoft.com/office/drawing/2014/main" id="{FF2634C0-E38D-E8D4-DB10-97F1A2337674}"/>
+              </a:ext>
+            </a:extLst>
+          </p:cNvPr>
+          <p:cNvSpPr/>
+          <p:nvPr/>
+        </p:nvSpPr>
+        <p:spPr>
+          <a:xfrm>
+            <a:off x="993912" y="1938130"/>
+            <a:ext cx="10515599" cy="800886"/>
+          </a:xfrm>
+          <a:prstGeom prst="rect">
+            <a:avLst/>
+          </a:prstGeom>
+          <a:solidFill>
+            <a:schemeClr val="bg1"/>
+          </a:solidFill>
+        </p:spPr>
+        <p:style>
+          <a:lnRef idx="2">
+            <a:schemeClr val="accent1">
+              <a:shade val="15000"/>
+            </a:schemeClr>
+          </a:lnRef>
+          <a:fillRef idx="1">
+            <a:schemeClr val="accent1"/>
+          </a:fillRef>
+          <a:effectRef idx="0">
+            <a:schemeClr val="accent1"/>
+          </a:effectRef>
+          <a:fontRef idx="minor">
+            <a:schemeClr val="lt1"/>
+          </a:fontRef>
+        </p:style>
+        <p:txBody>
+          <a:bodyPr rtlCol="0" anchor="ctr"/>
+          <a:lstStyle/>
+          <a:p>
+            <a:pPr algn="ctr"/>
+            <a:endParaRPr lang="en-US" sz="1400"/>
+          </a:p>
+        </p:txBody>
+      </p:sp>
+      <p:sp>
+        <p:nvSpPr>
+          <p:cNvPr id="14" name="Rectangle 13">
+            <a:extLst>
+              <a:ext uri="{FF2B5EF4-FFF2-40B4-BE49-F238E27FC236}">
+                <a16:creationId xmlns:a16="http://schemas.microsoft.com/office/drawing/2014/main" id="{CD407A73-AE1D-C11F-315D-7FC668062760}"/>
+              </a:ext>
+            </a:extLst>
+          </p:cNvPr>
+          <p:cNvSpPr/>
+          <p:nvPr/>
+        </p:nvSpPr>
+        <p:spPr>
+          <a:xfrm>
+            <a:off x="1115810" y="2042319"/>
+            <a:ext cx="983861" cy="270298"/>
+          </a:xfrm>
+          <a:prstGeom prst="rect">
+            <a:avLst/>
+          </a:prstGeom>
+          <a:solidFill>
+            <a:schemeClr val="bg1"/>
+          </a:solidFill>
+        </p:spPr>
+        <p:style>
+          <a:lnRef idx="2">
+            <a:schemeClr val="accent1">
+              <a:shade val="15000"/>
+            </a:schemeClr>
+          </a:lnRef>
+          <a:fillRef idx="1">
+            <a:schemeClr val="accent1"/>
+          </a:fillRef>
+          <a:effectRef idx="0">
+            <a:schemeClr val="accent1"/>
+          </a:effectRef>
+          <a:fontRef idx="minor">
+            <a:schemeClr val="lt1"/>
+          </a:fontRef>
+        </p:style>
+        <p:txBody>
+          <a:bodyPr rtlCol="0" anchor="ctr"/>
+          <a:lstStyle/>
+          <a:p>
+            <a:pPr algn="ctr"/>
+            <a:r>
+              <a:rPr lang="en-US" sz="1400" dirty="0">
+                <a:solidFill>
+                  <a:schemeClr val="tx1"/>
+                </a:solidFill>
+              </a:rPr>
+              <a:t>Search by:</a:t>
+            </a:r>
+          </a:p>
+        </p:txBody>
+      </p:sp>
+      <p:sp>
+        <p:nvSpPr>
+          <p:cNvPr id="34" name="Rectangle 33">
+            <a:extLst>
+              <a:ext uri="{FF2B5EF4-FFF2-40B4-BE49-F238E27FC236}">
+                <a16:creationId xmlns:a16="http://schemas.microsoft.com/office/drawing/2014/main" id="{7BD66022-30C6-2B2A-E890-4C893313BF46}"/>
+              </a:ext>
+            </a:extLst>
+          </p:cNvPr>
+          <p:cNvSpPr/>
+          <p:nvPr/>
+        </p:nvSpPr>
+        <p:spPr>
+          <a:xfrm>
+            <a:off x="5721072" y="2363290"/>
+            <a:ext cx="4468299" cy="270298"/>
+          </a:xfrm>
+          <a:prstGeom prst="rect">
+            <a:avLst/>
+          </a:prstGeom>
+          <a:solidFill>
+            <a:schemeClr val="bg1"/>
+          </a:solidFill>
+        </p:spPr>
+        <p:style>
+          <a:lnRef idx="2">
+            <a:schemeClr val="accent1">
+              <a:shade val="15000"/>
+            </a:schemeClr>
+          </a:lnRef>
+          <a:fillRef idx="1">
+            <a:schemeClr val="accent1"/>
+          </a:fillRef>
+          <a:effectRef idx="0">
+            <a:schemeClr val="accent1"/>
+          </a:effectRef>
+          <a:fontRef idx="minor">
+            <a:schemeClr val="lt1"/>
+          </a:fontRef>
+        </p:style>
+        <p:txBody>
+          <a:bodyPr rtlCol="0" anchor="ctr"/>
+          <a:lstStyle/>
+          <a:p>
+            <a:pPr algn="ctr"/>
+            <a:r>
+              <a:rPr lang="en-US" sz="1200" dirty="0">
+                <a:solidFill>
+                  <a:schemeClr val="bg1">
+                    <a:lumMod val="65000"/>
+                  </a:schemeClr>
+                </a:solidFill>
+              </a:rPr>
+              <a:t>enter search text  </a:t>
+            </a:r>
+          </a:p>
+        </p:txBody>
+      </p:sp>
+      <p:sp>
+        <p:nvSpPr>
+          <p:cNvPr id="35" name="Rounded Rectangle 34">
+            <a:extLst>
+              <a:ext uri="{FF2B5EF4-FFF2-40B4-BE49-F238E27FC236}">
+                <a16:creationId xmlns:a16="http://schemas.microsoft.com/office/drawing/2014/main" id="{3DF9D9B5-A1D7-165A-33A3-2061FD006BBA}"/>
+              </a:ext>
+            </a:extLst>
+          </p:cNvPr>
+          <p:cNvSpPr/>
+          <p:nvPr/>
+        </p:nvSpPr>
+        <p:spPr>
+          <a:xfrm>
+            <a:off x="10357511" y="2363290"/>
+            <a:ext cx="983861" cy="271213"/>
+          </a:xfrm>
+          <a:prstGeom prst="roundRect">
+            <a:avLst/>
+          </a:prstGeom>
+          <a:solidFill>
+            <a:schemeClr val="accent1">
+              <a:lumMod val="20000"/>
+              <a:lumOff val="80000"/>
+            </a:schemeClr>
+          </a:solidFill>
+        </p:spPr>
+        <p:style>
+          <a:lnRef idx="2">
+            <a:schemeClr val="accent1">
+              <a:shade val="15000"/>
+            </a:schemeClr>
+          </a:lnRef>
+          <a:fillRef idx="1">
+            <a:schemeClr val="accent1"/>
+          </a:fillRef>
+          <a:effectRef idx="0">
+            <a:schemeClr val="accent1"/>
+          </a:effectRef>
+          <a:fontRef idx="minor">
+            <a:schemeClr val="lt1"/>
+          </a:fontRef>
+        </p:style>
+        <p:txBody>
+          <a:bodyPr rtlCol="0" anchor="ctr"/>
+          <a:lstStyle/>
+          <a:p>
+            <a:pPr algn="ctr"/>
+            <a:r>
+              <a:rPr lang="en-US" sz="1400" dirty="0">
+                <a:solidFill>
+                  <a:schemeClr val="bg1">
+                    <a:lumMod val="65000"/>
+                  </a:schemeClr>
+                </a:solidFill>
+              </a:rPr>
+              <a:t>Search</a:t>
+            </a:r>
+          </a:p>
+        </p:txBody>
+      </p:sp>
+      <p:grpSp>
+        <p:nvGrpSpPr>
+          <p:cNvPr id="47" name="Group 46">
+            <a:extLst>
+              <a:ext uri="{FF2B5EF4-FFF2-40B4-BE49-F238E27FC236}">
+                <a16:creationId xmlns:a16="http://schemas.microsoft.com/office/drawing/2014/main" id="{3FA192B7-C7A2-4C56-7924-D416806F83E9}"/>
+              </a:ext>
+            </a:extLst>
+          </p:cNvPr>
+          <p:cNvGrpSpPr/>
+          <p:nvPr/>
+        </p:nvGrpSpPr>
+        <p:grpSpPr>
+          <a:xfrm>
+            <a:off x="5779162" y="3440980"/>
+            <a:ext cx="278296" cy="2696597"/>
+            <a:chOff x="4652069" y="3133245"/>
+            <a:chExt cx="282070" cy="2949312"/>
+          </a:xfrm>
+        </p:grpSpPr>
+        <p:sp>
+          <p:nvSpPr>
+            <p:cNvPr id="44" name="Rectangle 43">
+              <a:extLst>
+                <a:ext uri="{FF2B5EF4-FFF2-40B4-BE49-F238E27FC236}">
+                  <a16:creationId xmlns:a16="http://schemas.microsoft.com/office/drawing/2014/main" id="{D657748D-B6E0-58DD-B9D5-E49BF9D5977D}"/>
+                </a:ext>
+              </a:extLst>
+            </p:cNvPr>
+            <p:cNvSpPr/>
+            <p:nvPr/>
+          </p:nvSpPr>
+          <p:spPr>
+            <a:xfrm>
+              <a:off x="4652069" y="3133245"/>
+              <a:ext cx="278295" cy="2949312"/>
+            </a:xfrm>
+            <a:prstGeom prst="rect">
+              <a:avLst/>
+            </a:prstGeom>
+            <a:solidFill>
+              <a:schemeClr val="bg1"/>
+            </a:solidFill>
+          </p:spPr>
+          <p:style>
+            <a:lnRef idx="2">
+              <a:schemeClr val="accent1">
+                <a:shade val="15000"/>
+              </a:schemeClr>
+            </a:lnRef>
+            <a:fillRef idx="1">
+              <a:schemeClr val="accent1"/>
+            </a:fillRef>
+            <a:effectRef idx="0">
+              <a:schemeClr val="accent1"/>
+            </a:effectRef>
+            <a:fontRef idx="minor">
+              <a:schemeClr val="lt1"/>
+            </a:fontRef>
+          </p:style>
+          <p:txBody>
+            <a:bodyPr rtlCol="0" anchor="ctr"/>
+            <a:lstStyle/>
+            <a:p>
+              <a:pPr algn="ctr"/>
+              <a:endParaRPr lang="en-US" sz="1400"/>
+            </a:p>
+          </p:txBody>
+        </p:sp>
+        <p:sp>
+          <p:nvSpPr>
+            <p:cNvPr id="45" name="Triangle 44">
+              <a:extLst>
+                <a:ext uri="{FF2B5EF4-FFF2-40B4-BE49-F238E27FC236}">
+                  <a16:creationId xmlns:a16="http://schemas.microsoft.com/office/drawing/2014/main" id="{63FA6C48-5AFA-CBCB-BE52-E518DBE5CF51}"/>
+                </a:ext>
+              </a:extLst>
+            </p:cNvPr>
+            <p:cNvSpPr/>
+            <p:nvPr/>
+          </p:nvSpPr>
+          <p:spPr>
+            <a:xfrm>
+              <a:off x="4675722" y="3141869"/>
+              <a:ext cx="258417" cy="208722"/>
+            </a:xfrm>
+            <a:prstGeom prst="triangle">
+              <a:avLst/>
+            </a:prstGeom>
+          </p:spPr>
+          <p:style>
+            <a:lnRef idx="2">
+              <a:schemeClr val="accent1">
+                <a:shade val="15000"/>
+              </a:schemeClr>
+            </a:lnRef>
+            <a:fillRef idx="1">
+              <a:schemeClr val="accent1"/>
+            </a:fillRef>
+            <a:effectRef idx="0">
+              <a:schemeClr val="accent1"/>
+            </a:effectRef>
+            <a:fontRef idx="minor">
+              <a:schemeClr val="lt1"/>
+            </a:fontRef>
+          </p:style>
+          <p:txBody>
+            <a:bodyPr rtlCol="0" anchor="ctr"/>
+            <a:lstStyle/>
+            <a:p>
+              <a:pPr algn="ctr"/>
+              <a:endParaRPr lang="en-US"/>
+            </a:p>
+          </p:txBody>
+        </p:sp>
+        <p:sp>
+          <p:nvSpPr>
+            <p:cNvPr id="46" name="Triangle 45">
+              <a:extLst>
+                <a:ext uri="{FF2B5EF4-FFF2-40B4-BE49-F238E27FC236}">
+                  <a16:creationId xmlns:a16="http://schemas.microsoft.com/office/drawing/2014/main" id="{889050F6-5C32-D83F-7752-E2A5F66A6223}"/>
+                </a:ext>
+              </a:extLst>
+            </p:cNvPr>
+            <p:cNvSpPr/>
+            <p:nvPr/>
+          </p:nvSpPr>
+          <p:spPr>
+            <a:xfrm flipV="1">
+              <a:off x="4668172" y="5866608"/>
+              <a:ext cx="258417" cy="208722"/>
+            </a:xfrm>
+            <a:prstGeom prst="triangle">
+              <a:avLst/>
+            </a:prstGeom>
+          </p:spPr>
+          <p:style>
+            <a:lnRef idx="2">
+              <a:schemeClr val="accent1">
+                <a:shade val="15000"/>
+              </a:schemeClr>
+            </a:lnRef>
+            <a:fillRef idx="1">
+              <a:schemeClr val="accent1"/>
+            </a:fillRef>
+            <a:effectRef idx="0">
+              <a:schemeClr val="accent1"/>
+            </a:effectRef>
+            <a:fontRef idx="minor">
+              <a:schemeClr val="lt1"/>
+            </a:fontRef>
+          </p:style>
+          <p:txBody>
+            <a:bodyPr rtlCol="0" anchor="ctr"/>
+            <a:lstStyle/>
+            <a:p>
+              <a:pPr algn="ctr"/>
+              <a:endParaRPr lang="en-US"/>
+            </a:p>
+          </p:txBody>
+        </p:sp>
+      </p:grpSp>
+      <p:sp>
+        <p:nvSpPr>
+          <p:cNvPr id="54" name="Rectangle 53">
+            <a:extLst>
+              <a:ext uri="{FF2B5EF4-FFF2-40B4-BE49-F238E27FC236}">
+                <a16:creationId xmlns:a16="http://schemas.microsoft.com/office/drawing/2014/main" id="{56F4D992-EB92-51A2-B13F-703D12B0FB51}"/>
+              </a:ext>
+            </a:extLst>
+          </p:cNvPr>
+          <p:cNvSpPr/>
+          <p:nvPr/>
+        </p:nvSpPr>
+        <p:spPr>
+          <a:xfrm>
+            <a:off x="7551557" y="2799307"/>
+            <a:ext cx="1630018" cy="270298"/>
+          </a:xfrm>
+          <a:prstGeom prst="rect">
+            <a:avLst/>
+          </a:prstGeom>
+          <a:solidFill>
+            <a:schemeClr val="bg1"/>
+          </a:solidFill>
+          <a:ln>
+            <a:noFill/>
+          </a:ln>
+        </p:spPr>
+        <p:style>
+          <a:lnRef idx="2">
+            <a:schemeClr val="accent1">
+              <a:shade val="15000"/>
+            </a:schemeClr>
+          </a:lnRef>
+          <a:fillRef idx="1">
+            <a:schemeClr val="accent1"/>
+          </a:fillRef>
+          <a:effectRef idx="0">
+            <a:schemeClr val="accent1"/>
+          </a:effectRef>
+          <a:fontRef idx="minor">
+            <a:schemeClr val="lt1"/>
+          </a:fontRef>
+        </p:style>
+        <p:txBody>
+          <a:bodyPr rtlCol="0" anchor="ctr"/>
+          <a:lstStyle/>
+          <a:p>
+            <a:r>
+              <a:rPr lang="en-US" sz="1400" dirty="0">
+                <a:solidFill>
+                  <a:schemeClr val="tx1"/>
+                </a:solidFill>
+              </a:rPr>
+              <a:t>Kit Details</a:t>
+            </a:r>
+          </a:p>
+        </p:txBody>
+      </p:sp>
+      <p:sp>
+        <p:nvSpPr>
+          <p:cNvPr id="59" name="Oval 58">
+            <a:extLst>
+              <a:ext uri="{FF2B5EF4-FFF2-40B4-BE49-F238E27FC236}">
+                <a16:creationId xmlns:a16="http://schemas.microsoft.com/office/drawing/2014/main" id="{C9561C4B-FD3B-4F57-58C2-742132D0BCE2}"/>
+              </a:ext>
+            </a:extLst>
+          </p:cNvPr>
+          <p:cNvSpPr/>
+          <p:nvPr/>
+        </p:nvSpPr>
+        <p:spPr>
+          <a:xfrm>
+            <a:off x="10712332" y="1361966"/>
+            <a:ext cx="641468" cy="538500"/>
+          </a:xfrm>
+          <a:prstGeom prst="ellipse">
+            <a:avLst/>
+          </a:prstGeom>
+          <a:solidFill>
+            <a:schemeClr val="bg1"/>
+          </a:solidFill>
+        </p:spPr>
+        <p:style>
+          <a:lnRef idx="2">
+            <a:schemeClr val="accent1">
+              <a:shade val="15000"/>
+            </a:schemeClr>
+          </a:lnRef>
+          <a:fillRef idx="1">
+            <a:schemeClr val="accent1"/>
+          </a:fillRef>
+          <a:effectRef idx="0">
+            <a:schemeClr val="accent1"/>
+          </a:effectRef>
+          <a:fontRef idx="minor">
+            <a:schemeClr val="lt1"/>
+          </a:fontRef>
+        </p:style>
+        <p:txBody>
+          <a:bodyPr rtlCol="0" anchor="ctr"/>
+          <a:lstStyle/>
+          <a:p>
+            <a:pPr algn="ctr"/>
+            <a:r>
+              <a:rPr lang="en-US" sz="1050" dirty="0">
+                <a:solidFill>
+                  <a:schemeClr val="tx1"/>
+                </a:solidFill>
+              </a:rPr>
+              <a:t>User</a:t>
+            </a:r>
+          </a:p>
+          <a:p>
+            <a:pPr algn="ctr"/>
+            <a:r>
+              <a:rPr lang="en-US" sz="1050" dirty="0">
+                <a:solidFill>
+                  <a:schemeClr val="tx1"/>
+                </a:solidFill>
+              </a:rPr>
+              <a:t>Icon</a:t>
+            </a:r>
+          </a:p>
+        </p:txBody>
+      </p:sp>
+      <p:sp>
+        <p:nvSpPr>
+          <p:cNvPr id="63" name="Cloud Callout 62">
+            <a:extLst>
+              <a:ext uri="{FF2B5EF4-FFF2-40B4-BE49-F238E27FC236}">
+                <a16:creationId xmlns:a16="http://schemas.microsoft.com/office/drawing/2014/main" id="{DFE2305A-8341-6035-C0D7-FD6305B031A0}"/>
+              </a:ext>
+            </a:extLst>
+          </p:cNvPr>
+          <p:cNvSpPr/>
+          <p:nvPr/>
+        </p:nvSpPr>
+        <p:spPr>
+          <a:xfrm>
+            <a:off x="10006433" y="384731"/>
+            <a:ext cx="1764064" cy="613827"/>
+          </a:xfrm>
+          <a:prstGeom prst="cloudCallout">
+            <a:avLst>
+              <a:gd name="adj1" fmla="val 3715"/>
+              <a:gd name="adj2" fmla="val 111795"/>
+            </a:avLst>
+          </a:prstGeom>
+        </p:spPr>
+        <p:style>
+          <a:lnRef idx="2">
+            <a:schemeClr val="accent1">
+              <a:shade val="15000"/>
+            </a:schemeClr>
+          </a:lnRef>
+          <a:fillRef idx="1">
+            <a:schemeClr val="accent1"/>
+          </a:fillRef>
+          <a:effectRef idx="0">
+            <a:schemeClr val="accent1"/>
+          </a:effectRef>
+          <a:fontRef idx="minor">
+            <a:schemeClr val="lt1"/>
+          </a:fontRef>
+        </p:style>
+        <p:txBody>
+          <a:bodyPr rtlCol="0" anchor="ctr"/>
+          <a:lstStyle/>
+          <a:p>
+            <a:r>
+              <a:rPr lang="en-US" sz="1200" i="1" dirty="0"/>
+              <a:t>Menu:</a:t>
+            </a:r>
+          </a:p>
+          <a:p>
+            <a:pPr marL="171450" indent="-171450">
+              <a:buFont typeface="Arial" panose="020B0604020202020204" pitchFamily="34" charset="0"/>
+              <a:buChar char="•"/>
+            </a:pPr>
+            <a:r>
+              <a:rPr lang="en-US" sz="1200" i="1" dirty="0"/>
+              <a:t>Sign out</a:t>
+            </a:r>
+          </a:p>
+          <a:p>
+            <a:pPr marL="171450" indent="-171450">
+              <a:buFont typeface="Arial" panose="020B0604020202020204" pitchFamily="34" charset="0"/>
+              <a:buChar char="•"/>
+            </a:pPr>
+            <a:r>
+              <a:rPr lang="en-US" sz="1200" i="1" dirty="0"/>
+              <a:t>Accounts</a:t>
+            </a:r>
+          </a:p>
+        </p:txBody>
+      </p:sp>
+      <p:sp>
+        <p:nvSpPr>
+          <p:cNvPr id="64" name="Right Arrow 63">
+            <a:extLst>
+              <a:ext uri="{FF2B5EF4-FFF2-40B4-BE49-F238E27FC236}">
+                <a16:creationId xmlns:a16="http://schemas.microsoft.com/office/drawing/2014/main" id="{4D377C34-EA3D-A57C-5CC7-56AA34706538}"/>
+              </a:ext>
+            </a:extLst>
+          </p:cNvPr>
+          <p:cNvSpPr/>
+          <p:nvPr/>
+        </p:nvSpPr>
+        <p:spPr>
+          <a:xfrm>
+            <a:off x="546243" y="3832578"/>
+            <a:ext cx="510511" cy="56378"/>
+          </a:xfrm>
+          <a:prstGeom prst="rightArrow">
+            <a:avLst/>
+          </a:prstGeom>
+          <a:solidFill>
+            <a:schemeClr val="tx1"/>
+          </a:solidFill>
+        </p:spPr>
+        <p:style>
+          <a:lnRef idx="2">
+            <a:schemeClr val="accent1">
+              <a:shade val="15000"/>
+            </a:schemeClr>
+          </a:lnRef>
+          <a:fillRef idx="1">
+            <a:schemeClr val="accent1"/>
+          </a:fillRef>
+          <a:effectRef idx="0">
+            <a:schemeClr val="accent1"/>
+          </a:effectRef>
+          <a:fontRef idx="minor">
+            <a:schemeClr val="lt1"/>
+          </a:fontRef>
+        </p:style>
+        <p:txBody>
+          <a:bodyPr rtlCol="0" anchor="ctr"/>
+          <a:lstStyle/>
+          <a:p>
+            <a:pPr algn="ctr"/>
+            <a:endParaRPr lang="en-US" b="1" dirty="0">
+              <a:solidFill>
+                <a:schemeClr val="accent1"/>
+              </a:solidFill>
+            </a:endParaRPr>
+          </a:p>
+        </p:txBody>
+      </p:sp>
+      <p:sp>
+        <p:nvSpPr>
+          <p:cNvPr id="8" name="TextBox 7">
+            <a:extLst>
+              <a:ext uri="{FF2B5EF4-FFF2-40B4-BE49-F238E27FC236}">
+                <a16:creationId xmlns:a16="http://schemas.microsoft.com/office/drawing/2014/main" id="{9CFD91E1-6512-C3F6-EE4A-60F5E81CA225}"/>
+              </a:ext>
+            </a:extLst>
+          </p:cNvPr>
+          <p:cNvSpPr txBox="1"/>
+          <p:nvPr/>
+        </p:nvSpPr>
+        <p:spPr>
+          <a:xfrm>
+            <a:off x="2306225" y="1438671"/>
+            <a:ext cx="1468222" cy="369332"/>
+          </a:xfrm>
+          <a:prstGeom prst="rect">
+            <a:avLst/>
+          </a:prstGeom>
+          <a:noFill/>
+        </p:spPr>
+        <p:txBody>
+          <a:bodyPr wrap="none" rtlCol="0">
+            <a:spAutoFit/>
+          </a:bodyPr>
+          <a:lstStyle/>
+          <a:p>
+            <a:r>
+              <a:rPr lang="en-US" dirty="0"/>
+              <a:t>Start Kit Repo</a:t>
+            </a:r>
+          </a:p>
+        </p:txBody>
+      </p:sp>
+      <p:graphicFrame>
+        <p:nvGraphicFramePr>
+          <p:cNvPr id="36" name="Table 35">
+            <a:extLst>
+              <a:ext uri="{FF2B5EF4-FFF2-40B4-BE49-F238E27FC236}">
+                <a16:creationId xmlns:a16="http://schemas.microsoft.com/office/drawing/2014/main" id="{2E394261-1724-7045-23BF-AA04D6A6E420}"/>
+              </a:ext>
+            </a:extLst>
+          </p:cNvPr>
+          <p:cNvGraphicFramePr>
+            <a:graphicFrameLocks noGrp="1"/>
+          </p:cNvGraphicFramePr>
+          <p:nvPr>
+            <p:extLst>
+              <p:ext uri="{D42A27DB-BD31-4B8C-83A1-F6EECF244321}">
+                <p14:modId xmlns:p14="http://schemas.microsoft.com/office/powerpoint/2010/main" val="1007643277"/>
+              </p:ext>
+            </p:extLst>
+          </p:nvPr>
+        </p:nvGraphicFramePr>
+        <p:xfrm>
+          <a:off x="1098180" y="3106477"/>
+          <a:ext cx="4714620" cy="3031099"/>
+        </p:xfrm>
+        <a:graphic>
+          <a:graphicData uri="http://schemas.openxmlformats.org/drawingml/2006/table">
+            <a:tbl>
+              <a:tblPr firstRow="1" bandRow="1">
+                <a:tableStyleId>{5C22544A-7EE6-4342-B048-85BDC9FD1C3A}</a:tableStyleId>
+              </a:tblPr>
+              <a:tblGrid>
+                <a:gridCol w="856660">
+                  <a:extLst>
+                    <a:ext uri="{9D8B030D-6E8A-4147-A177-3AD203B41FA5}">
+                      <a16:colId xmlns:a16="http://schemas.microsoft.com/office/drawing/2014/main" val="2926046560"/>
+                    </a:ext>
+                  </a:extLst>
+                </a:gridCol>
+                <a:gridCol w="3857960">
+                  <a:extLst>
+                    <a:ext uri="{9D8B030D-6E8A-4147-A177-3AD203B41FA5}">
+                      <a16:colId xmlns:a16="http://schemas.microsoft.com/office/drawing/2014/main" val="1999410656"/>
+                    </a:ext>
+                  </a:extLst>
+                </a:gridCol>
+              </a:tblGrid>
+              <a:tr h="311956">
+                <a:tc>
+                  <a:txBody>
+                    <a:bodyPr/>
+                    <a:lstStyle/>
+                    <a:p>
+                      <a:r>
+                        <a:rPr lang="en-US" sz="1400" dirty="0"/>
+                        <a:t>PROD-ID</a:t>
+                      </a:r>
+                    </a:p>
+                  </a:txBody>
+                  <a:tcPr/>
+                </a:tc>
+                <a:tc>
+                  <a:txBody>
+                    <a:bodyPr/>
+                    <a:lstStyle/>
+                    <a:p>
+                      <a:r>
+                        <a:rPr lang="en-US" sz="1400" dirty="0"/>
+                        <a:t>TITLE</a:t>
+                      </a:r>
+                    </a:p>
+                  </a:txBody>
+                  <a:tcPr>
+                    <a:solidFill>
+                      <a:schemeClr val="accent1"/>
+                    </a:solidFill>
+                  </a:tcPr>
+                </a:tc>
+                <a:extLst>
+                  <a:ext uri="{0D108BD9-81ED-4DB2-BD59-A6C34878D82A}">
+                    <a16:rowId xmlns:a16="http://schemas.microsoft.com/office/drawing/2014/main" val="1550999038"/>
+                  </a:ext>
+                </a:extLst>
+              </a:tr>
+              <a:tr h="302127">
+                <a:tc>
+                  <a:txBody>
+                    <a:bodyPr/>
+                    <a:lstStyle/>
+                    <a:p>
+                      <a:r>
+                        <a:rPr lang="en-US" sz="1200" dirty="0"/>
+                        <a:t>NJS1234</a:t>
+                      </a:r>
+                    </a:p>
+                  </a:txBody>
+                  <a:tcPr/>
+                </a:tc>
+                <a:tc>
+                  <a:txBody>
+                    <a:bodyPr/>
+                    <a:lstStyle/>
+                    <a:p>
+                      <a:r>
+                        <a:rPr lang="en-US" sz="1200" dirty="0"/>
+                        <a:t>NextJS travel site, v1</a:t>
+                      </a:r>
+                    </a:p>
+                  </a:txBody>
+                  <a:tcPr>
+                    <a:solidFill>
+                      <a:schemeClr val="accent1">
+                        <a:tint val="40000"/>
+                      </a:schemeClr>
+                    </a:solidFill>
+                  </a:tcPr>
+                </a:tc>
+                <a:extLst>
+                  <a:ext uri="{0D108BD9-81ED-4DB2-BD59-A6C34878D82A}">
+                    <a16:rowId xmlns:a16="http://schemas.microsoft.com/office/drawing/2014/main" val="1041094789"/>
+                  </a:ext>
+                </a:extLst>
+              </a:tr>
+              <a:tr h="302127">
+                <a:tc>
+                  <a:txBody>
+                    <a:bodyPr/>
+                    <a:lstStyle/>
+                    <a:p>
+                      <a:r>
+                        <a:rPr lang="en-US" sz="1200" dirty="0"/>
+                        <a:t>NJS2239</a:t>
+                      </a:r>
+                    </a:p>
+                  </a:txBody>
+                  <a:tcPr/>
+                </a:tc>
+                <a:tc>
+                  <a:txBody>
+                    <a:bodyPr/>
+                    <a:lstStyle/>
+                    <a:p>
+                      <a:pPr marL="0" marR="0" lvl="0" indent="0" algn="l" defTabSz="914400" rtl="0" eaLnBrk="1" fontAlgn="auto" latinLnBrk="0" hangingPunct="1">
+                        <a:lnSpc>
+                          <a:spcPct val="100000"/>
+                        </a:lnSpc>
+                        <a:spcBef>
+                          <a:spcPts val="0"/>
+                        </a:spcBef>
+                        <a:spcAft>
+                          <a:spcPts val="0"/>
+                        </a:spcAft>
+                        <a:buClrTx/>
+                        <a:buSzTx/>
+                        <a:buFontTx/>
+                        <a:buNone/>
+                        <a:tabLst/>
+                        <a:defRPr/>
+                      </a:pPr>
+                      <a:r>
+                        <a:rPr lang="en-US" sz="1200" dirty="0"/>
+                        <a:t>NextJS travel site, v3</a:t>
+                      </a:r>
+                    </a:p>
+                  </a:txBody>
+                  <a:tcPr>
+                    <a:solidFill>
+                      <a:schemeClr val="accent1">
+                        <a:tint val="20000"/>
+                      </a:schemeClr>
+                    </a:solidFill>
+                  </a:tcPr>
+                </a:tc>
+                <a:extLst>
+                  <a:ext uri="{0D108BD9-81ED-4DB2-BD59-A6C34878D82A}">
+                    <a16:rowId xmlns:a16="http://schemas.microsoft.com/office/drawing/2014/main" val="343489194"/>
+                  </a:ext>
+                </a:extLst>
+              </a:tr>
+              <a:tr h="302127">
+                <a:tc>
+                  <a:txBody>
+                    <a:bodyPr/>
+                    <a:lstStyle/>
+                    <a:p>
+                      <a:r>
+                        <a:rPr lang="en-US" sz="1200" dirty="0"/>
+                        <a:t>RAG43X</a:t>
+                      </a:r>
+                    </a:p>
+                  </a:txBody>
+                  <a:tcPr/>
+                </a:tc>
+                <a:tc>
+                  <a:txBody>
+                    <a:bodyPr/>
+                    <a:lstStyle/>
+                    <a:p>
+                      <a:r>
+                        <a:rPr lang="en-US" sz="1200" dirty="0"/>
+                        <a:t>RAG kit</a:t>
+                      </a:r>
+                    </a:p>
+                  </a:txBody>
+                  <a:tcPr>
+                    <a:solidFill>
+                      <a:schemeClr val="accent1">
+                        <a:tint val="40000"/>
+                      </a:schemeClr>
+                    </a:solidFill>
+                  </a:tcPr>
+                </a:tc>
+                <a:extLst>
+                  <a:ext uri="{0D108BD9-81ED-4DB2-BD59-A6C34878D82A}">
+                    <a16:rowId xmlns:a16="http://schemas.microsoft.com/office/drawing/2014/main" val="3100013451"/>
+                  </a:ext>
+                </a:extLst>
+              </a:tr>
+              <a:tr h="302127">
+                <a:tc>
+                  <a:txBody>
+                    <a:bodyPr/>
+                    <a:lstStyle/>
+                    <a:p>
+                      <a:endParaRPr lang="en-US" sz="1200" dirty="0"/>
+                    </a:p>
+                  </a:txBody>
+                  <a:tcPr/>
+                </a:tc>
+                <a:tc>
+                  <a:txBody>
+                    <a:bodyPr/>
+                    <a:lstStyle/>
+                    <a:p>
+                      <a:r>
+                        <a:rPr lang="en-US" sz="1200" dirty="0"/>
+                        <a:t>…</a:t>
+                      </a:r>
+                    </a:p>
+                  </a:txBody>
+                  <a:tcPr>
+                    <a:solidFill>
+                      <a:schemeClr val="accent1">
+                        <a:tint val="20000"/>
+                      </a:schemeClr>
+                    </a:solidFill>
+                  </a:tcPr>
+                </a:tc>
+                <a:extLst>
+                  <a:ext uri="{0D108BD9-81ED-4DB2-BD59-A6C34878D82A}">
+                    <a16:rowId xmlns:a16="http://schemas.microsoft.com/office/drawing/2014/main" val="1035038747"/>
+                  </a:ext>
+                </a:extLst>
+              </a:tr>
+              <a:tr h="302127">
+                <a:tc>
+                  <a:txBody>
+                    <a:bodyPr/>
+                    <a:lstStyle/>
+                    <a:p>
+                      <a:endParaRPr lang="en-US" sz="1200" dirty="0"/>
+                    </a:p>
+                  </a:txBody>
+                  <a:tcPr/>
+                </a:tc>
+                <a:tc>
+                  <a:txBody>
+                    <a:bodyPr/>
+                    <a:lstStyle/>
+                    <a:p>
+                      <a:r>
+                        <a:rPr lang="en-US" sz="1200" dirty="0"/>
+                        <a:t>…</a:t>
+                      </a:r>
+                    </a:p>
+                  </a:txBody>
+                  <a:tcPr>
+                    <a:solidFill>
+                      <a:schemeClr val="accent1">
+                        <a:tint val="40000"/>
+                      </a:schemeClr>
+                    </a:solidFill>
+                  </a:tcPr>
+                </a:tc>
+                <a:extLst>
+                  <a:ext uri="{0D108BD9-81ED-4DB2-BD59-A6C34878D82A}">
+                    <a16:rowId xmlns:a16="http://schemas.microsoft.com/office/drawing/2014/main" val="1886068929"/>
+                  </a:ext>
+                </a:extLst>
+              </a:tr>
+              <a:tr h="302127">
+                <a:tc>
+                  <a:txBody>
+                    <a:bodyPr/>
+                    <a:lstStyle/>
+                    <a:p>
+                      <a:endParaRPr lang="en-US" sz="1200" dirty="0"/>
+                    </a:p>
+                  </a:txBody>
+                  <a:tcPr/>
+                </a:tc>
+                <a:tc>
+                  <a:txBody>
+                    <a:bodyPr/>
+                    <a:lstStyle/>
+                    <a:p>
+                      <a:endParaRPr lang="en-US" sz="1200" dirty="0"/>
+                    </a:p>
+                  </a:txBody>
+                  <a:tcPr>
+                    <a:solidFill>
+                      <a:schemeClr val="accent1">
+                        <a:tint val="20000"/>
+                      </a:schemeClr>
+                    </a:solidFill>
+                  </a:tcPr>
+                </a:tc>
+                <a:extLst>
+                  <a:ext uri="{0D108BD9-81ED-4DB2-BD59-A6C34878D82A}">
+                    <a16:rowId xmlns:a16="http://schemas.microsoft.com/office/drawing/2014/main" val="3359574854"/>
+                  </a:ext>
+                </a:extLst>
+              </a:tr>
+              <a:tr h="302127">
+                <a:tc>
+                  <a:txBody>
+                    <a:bodyPr/>
+                    <a:lstStyle/>
+                    <a:p>
+                      <a:endParaRPr lang="en-US" sz="1200" dirty="0"/>
+                    </a:p>
+                  </a:txBody>
+                  <a:tcPr/>
+                </a:tc>
+                <a:tc>
+                  <a:txBody>
+                    <a:bodyPr/>
+                    <a:lstStyle/>
+                    <a:p>
+                      <a:endParaRPr lang="en-US" sz="1200" dirty="0"/>
+                    </a:p>
+                  </a:txBody>
+                  <a:tcPr>
+                    <a:solidFill>
+                      <a:schemeClr val="accent1">
+                        <a:tint val="40000"/>
+                      </a:schemeClr>
+                    </a:solidFill>
+                  </a:tcPr>
+                </a:tc>
+                <a:extLst>
+                  <a:ext uri="{0D108BD9-81ED-4DB2-BD59-A6C34878D82A}">
+                    <a16:rowId xmlns:a16="http://schemas.microsoft.com/office/drawing/2014/main" val="2633555765"/>
+                  </a:ext>
+                </a:extLst>
+              </a:tr>
+              <a:tr h="302127">
+                <a:tc>
+                  <a:txBody>
+                    <a:bodyPr/>
+                    <a:lstStyle/>
+                    <a:p>
+                      <a:endParaRPr lang="en-US" sz="1200" dirty="0"/>
+                    </a:p>
+                  </a:txBody>
+                  <a:tcPr/>
+                </a:tc>
+                <a:tc>
+                  <a:txBody>
+                    <a:bodyPr/>
+                    <a:lstStyle/>
+                    <a:p>
+                      <a:endParaRPr lang="en-US" sz="1200" dirty="0"/>
+                    </a:p>
+                  </a:txBody>
+                  <a:tcPr>
+                    <a:solidFill>
+                      <a:schemeClr val="accent1">
+                        <a:tint val="20000"/>
+                      </a:schemeClr>
+                    </a:solidFill>
+                  </a:tcPr>
+                </a:tc>
+                <a:extLst>
+                  <a:ext uri="{0D108BD9-81ED-4DB2-BD59-A6C34878D82A}">
+                    <a16:rowId xmlns:a16="http://schemas.microsoft.com/office/drawing/2014/main" val="2628547942"/>
+                  </a:ext>
+                </a:extLst>
+              </a:tr>
+              <a:tr h="302127">
+                <a:tc>
+                  <a:txBody>
+                    <a:bodyPr/>
+                    <a:lstStyle/>
+                    <a:p>
+                      <a:endParaRPr lang="en-US" sz="1200" dirty="0"/>
+                    </a:p>
+                  </a:txBody>
+                  <a:tcPr/>
+                </a:tc>
+                <a:tc>
+                  <a:txBody>
+                    <a:bodyPr/>
+                    <a:lstStyle/>
+                    <a:p>
+                      <a:endParaRPr lang="en-US" sz="1200" dirty="0"/>
+                    </a:p>
+                  </a:txBody>
+                  <a:tcPr>
+                    <a:solidFill>
+                      <a:schemeClr val="accent1">
+                        <a:tint val="40000"/>
+                      </a:schemeClr>
+                    </a:solidFill>
+                  </a:tcPr>
+                </a:tc>
+                <a:extLst>
+                  <a:ext uri="{0D108BD9-81ED-4DB2-BD59-A6C34878D82A}">
+                    <a16:rowId xmlns:a16="http://schemas.microsoft.com/office/drawing/2014/main" val="2514792747"/>
+                  </a:ext>
+                </a:extLst>
+              </a:tr>
+            </a:tbl>
+          </a:graphicData>
+        </a:graphic>
+      </p:graphicFrame>
+      <p:graphicFrame>
+        <p:nvGraphicFramePr>
+          <p:cNvPr id="37" name="Table 36">
+            <a:extLst>
+              <a:ext uri="{FF2B5EF4-FFF2-40B4-BE49-F238E27FC236}">
+                <a16:creationId xmlns:a16="http://schemas.microsoft.com/office/drawing/2014/main" id="{EDAC4B28-4239-1173-21E2-15C2D58D75BE}"/>
+              </a:ext>
+            </a:extLst>
+          </p:cNvPr>
+          <p:cNvGraphicFramePr>
+            <a:graphicFrameLocks noGrp="1"/>
+          </p:cNvGraphicFramePr>
+          <p:nvPr>
+            <p:extLst>
+              <p:ext uri="{D42A27DB-BD31-4B8C-83A1-F6EECF244321}">
+                <p14:modId xmlns:p14="http://schemas.microsoft.com/office/powerpoint/2010/main" val="1651457439"/>
+              </p:ext>
+            </p:extLst>
+          </p:nvPr>
+        </p:nvGraphicFramePr>
+        <p:xfrm>
+          <a:off x="6406163" y="3106477"/>
+          <a:ext cx="4443278" cy="2773680"/>
+        </p:xfrm>
+        <a:graphic>
+          <a:graphicData uri="http://schemas.openxmlformats.org/drawingml/2006/table">
+            <a:tbl>
+              <a:tblPr firstRow="1" bandRow="1">
+                <a:tableStyleId>{5C22544A-7EE6-4342-B048-85BDC9FD1C3A}</a:tableStyleId>
+              </a:tblPr>
+              <a:tblGrid>
+                <a:gridCol w="1045888">
+                  <a:extLst>
+                    <a:ext uri="{9D8B030D-6E8A-4147-A177-3AD203B41FA5}">
+                      <a16:colId xmlns:a16="http://schemas.microsoft.com/office/drawing/2014/main" val="2926046560"/>
+                    </a:ext>
+                  </a:extLst>
+                </a:gridCol>
+                <a:gridCol w="3397390">
+                  <a:extLst>
+                    <a:ext uri="{9D8B030D-6E8A-4147-A177-3AD203B41FA5}">
+                      <a16:colId xmlns:a16="http://schemas.microsoft.com/office/drawing/2014/main" val="1999410656"/>
+                    </a:ext>
+                  </a:extLst>
+                </a:gridCol>
+              </a:tblGrid>
+              <a:tr h="120839">
+                <a:tc>
+                  <a:txBody>
+                    <a:bodyPr/>
+                    <a:lstStyle/>
+                    <a:p>
+                      <a:endParaRPr lang="en-US" sz="1400" dirty="0"/>
+                    </a:p>
+                  </a:txBody>
+                  <a:tcPr/>
+                </a:tc>
+                <a:tc>
+                  <a:txBody>
+                    <a:bodyPr/>
+                    <a:lstStyle/>
+                    <a:p>
+                      <a:pPr marL="0" marR="0" lvl="0" indent="0" algn="l" defTabSz="914400" rtl="0" eaLnBrk="1" fontAlgn="auto" latinLnBrk="0" hangingPunct="1">
+                        <a:lnSpc>
+                          <a:spcPct val="100000"/>
+                        </a:lnSpc>
+                        <a:spcBef>
+                          <a:spcPts val="0"/>
+                        </a:spcBef>
+                        <a:spcAft>
+                          <a:spcPts val="0"/>
+                        </a:spcAft>
+                        <a:buClrTx/>
+                        <a:buSzTx/>
+                        <a:buFontTx/>
+                        <a:buNone/>
+                        <a:tabLst/>
+                        <a:defRPr/>
+                      </a:pPr>
+                      <a:r>
+                        <a:rPr lang="en-US" sz="1400" dirty="0"/>
+                        <a:t>NextJS travel site, v3</a:t>
+                      </a:r>
+                    </a:p>
+                  </a:txBody>
+                  <a:tcPr/>
+                </a:tc>
+                <a:extLst>
+                  <a:ext uri="{0D108BD9-81ED-4DB2-BD59-A6C34878D82A}">
+                    <a16:rowId xmlns:a16="http://schemas.microsoft.com/office/drawing/2014/main" val="1550999038"/>
+                  </a:ext>
+                </a:extLst>
+              </a:tr>
+              <a:tr h="0">
+                <a:tc>
+                  <a:txBody>
+                    <a:bodyPr/>
+                    <a:lstStyle/>
+                    <a:p>
+                      <a:r>
+                        <a:rPr lang="en-US" sz="1200" dirty="0"/>
+                        <a:t>Release Date</a:t>
+                      </a:r>
+                    </a:p>
+                  </a:txBody>
+                  <a:tcPr/>
+                </a:tc>
+                <a:tc>
+                  <a:txBody>
+                    <a:bodyPr/>
+                    <a:lstStyle/>
+                    <a:p>
+                      <a:r>
+                        <a:rPr lang="en-US" sz="1200" dirty="0"/>
+                        <a:t>Jan 25</a:t>
+                      </a:r>
+                      <a:r>
+                        <a:rPr lang="en-US" sz="1200" baseline="30000" dirty="0"/>
+                        <a:t>th</a:t>
+                      </a:r>
+                      <a:r>
+                        <a:rPr lang="en-US" sz="1200" dirty="0"/>
+                        <a:t>, 2003</a:t>
+                      </a:r>
+                    </a:p>
+                  </a:txBody>
+                  <a:tcPr/>
+                </a:tc>
+                <a:extLst>
+                  <a:ext uri="{0D108BD9-81ED-4DB2-BD59-A6C34878D82A}">
+                    <a16:rowId xmlns:a16="http://schemas.microsoft.com/office/drawing/2014/main" val="1041094789"/>
+                  </a:ext>
+                </a:extLst>
+              </a:tr>
+              <a:tr h="0">
+                <a:tc>
+                  <a:txBody>
+                    <a:bodyPr/>
+                    <a:lstStyle/>
+                    <a:p>
+                      <a:r>
+                        <a:rPr lang="en-US" sz="1200" dirty="0"/>
+                        <a:t>Author</a:t>
+                      </a:r>
+                    </a:p>
+                  </a:txBody>
+                  <a:tcPr/>
+                </a:tc>
+                <a:tc>
+                  <a:txBody>
+                    <a:bodyPr/>
+                    <a:lstStyle/>
+                    <a:p>
+                      <a:pPr marL="0" marR="0" lvl="0" indent="0" algn="l" defTabSz="914400" rtl="0" eaLnBrk="1" fontAlgn="auto" latinLnBrk="0" hangingPunct="1">
+                        <a:lnSpc>
+                          <a:spcPct val="100000"/>
+                        </a:lnSpc>
+                        <a:spcBef>
+                          <a:spcPts val="0"/>
+                        </a:spcBef>
+                        <a:spcAft>
+                          <a:spcPts val="0"/>
+                        </a:spcAft>
+                        <a:buClrTx/>
+                        <a:buSzTx/>
+                        <a:buFontTx/>
+                        <a:buNone/>
+                        <a:tabLst/>
+                        <a:defRPr/>
+                      </a:pPr>
+                      <a:r>
+                        <a:rPr lang="en-US" sz="1200" dirty="0"/>
+                        <a:t>Brad Traversy</a:t>
+                      </a:r>
+                    </a:p>
+                  </a:txBody>
+                  <a:tcPr/>
+                </a:tc>
+                <a:extLst>
+                  <a:ext uri="{0D108BD9-81ED-4DB2-BD59-A6C34878D82A}">
+                    <a16:rowId xmlns:a16="http://schemas.microsoft.com/office/drawing/2014/main" val="343489194"/>
+                  </a:ext>
+                </a:extLst>
+              </a:tr>
+              <a:tr h="0">
+                <a:tc>
+                  <a:txBody>
+                    <a:bodyPr/>
+                    <a:lstStyle/>
+                    <a:p>
+                      <a:r>
+                        <a:rPr lang="en-US" sz="1200" dirty="0"/>
+                        <a:t>Category</a:t>
+                      </a:r>
+                    </a:p>
+                  </a:txBody>
+                  <a:tcPr/>
+                </a:tc>
+                <a:tc>
+                  <a:txBody>
+                    <a:bodyPr/>
+                    <a:lstStyle/>
+                    <a:p>
+                      <a:r>
+                        <a:rPr lang="en-US" sz="1200" dirty="0"/>
+                        <a:t>Next JS</a:t>
+                      </a:r>
+                    </a:p>
+                  </a:txBody>
+                  <a:tcPr/>
+                </a:tc>
+                <a:extLst>
+                  <a:ext uri="{0D108BD9-81ED-4DB2-BD59-A6C34878D82A}">
+                    <a16:rowId xmlns:a16="http://schemas.microsoft.com/office/drawing/2014/main" val="3100013451"/>
+                  </a:ext>
+                </a:extLst>
+              </a:tr>
+              <a:tr h="0">
+                <a:tc>
+                  <a:txBody>
+                    <a:bodyPr/>
+                    <a:lstStyle/>
+                    <a:p>
+                      <a:r>
+                        <a:rPr lang="en-US" sz="1200" dirty="0"/>
+                        <a:t>Tags</a:t>
+                      </a:r>
+                    </a:p>
+                  </a:txBody>
+                  <a:tcPr/>
+                </a:tc>
+                <a:tc>
+                  <a:txBody>
+                    <a:bodyPr/>
+                    <a:lstStyle/>
+                    <a:p>
+                      <a:r>
+                        <a:rPr lang="en-US" sz="1200" dirty="0"/>
+                        <a:t>Mongo/Atlas, </a:t>
+                      </a:r>
+                      <a:r>
+                        <a:rPr lang="en-US" sz="1200" dirty="0" err="1"/>
+                        <a:t>Vite</a:t>
+                      </a:r>
+                      <a:r>
+                        <a:rPr lang="en-US" sz="1200" dirty="0"/>
+                        <a:t>, Next JS, </a:t>
+                      </a:r>
+                    </a:p>
+                  </a:txBody>
+                  <a:tcPr/>
+                </a:tc>
+                <a:extLst>
+                  <a:ext uri="{0D108BD9-81ED-4DB2-BD59-A6C34878D82A}">
+                    <a16:rowId xmlns:a16="http://schemas.microsoft.com/office/drawing/2014/main" val="1035038747"/>
+                  </a:ext>
+                </a:extLst>
+              </a:tr>
+              <a:tr h="0">
+                <a:tc>
+                  <a:txBody>
+                    <a:bodyPr/>
+                    <a:lstStyle/>
+                    <a:p>
+                      <a:endParaRPr lang="en-US" sz="1200" dirty="0"/>
+                    </a:p>
+                  </a:txBody>
+                  <a:tcPr/>
+                </a:tc>
+                <a:tc>
+                  <a:txBody>
+                    <a:bodyPr/>
+                    <a:lstStyle/>
+                    <a:p>
+                      <a:r>
+                        <a:rPr lang="en-US" sz="1200" dirty="0"/>
+                        <a:t>…</a:t>
+                      </a:r>
+                    </a:p>
+                  </a:txBody>
+                  <a:tcPr/>
+                </a:tc>
+                <a:extLst>
+                  <a:ext uri="{0D108BD9-81ED-4DB2-BD59-A6C34878D82A}">
+                    <a16:rowId xmlns:a16="http://schemas.microsoft.com/office/drawing/2014/main" val="1886068929"/>
+                  </a:ext>
+                </a:extLst>
+              </a:tr>
+              <a:tr h="0">
+                <a:tc>
+                  <a:txBody>
+                    <a:bodyPr/>
+                    <a:lstStyle/>
+                    <a:p>
+                      <a:endParaRPr lang="en-US" sz="1200" dirty="0"/>
+                    </a:p>
+                  </a:txBody>
+                  <a:tcPr/>
+                </a:tc>
+                <a:tc>
+                  <a:txBody>
+                    <a:bodyPr/>
+                    <a:lstStyle/>
+                    <a:p>
+                      <a:endParaRPr lang="en-US" sz="1200" dirty="0"/>
+                    </a:p>
+                  </a:txBody>
+                  <a:tcPr/>
+                </a:tc>
+                <a:extLst>
+                  <a:ext uri="{0D108BD9-81ED-4DB2-BD59-A6C34878D82A}">
+                    <a16:rowId xmlns:a16="http://schemas.microsoft.com/office/drawing/2014/main" val="3359574854"/>
+                  </a:ext>
+                </a:extLst>
+              </a:tr>
+              <a:tr h="0">
+                <a:tc>
+                  <a:txBody>
+                    <a:bodyPr/>
+                    <a:lstStyle/>
+                    <a:p>
+                      <a:endParaRPr lang="en-US" sz="1200" dirty="0"/>
+                    </a:p>
+                  </a:txBody>
+                  <a:tcPr/>
+                </a:tc>
+                <a:tc>
+                  <a:txBody>
+                    <a:bodyPr/>
+                    <a:lstStyle/>
+                    <a:p>
+                      <a:endParaRPr lang="en-US" sz="1200" dirty="0"/>
+                    </a:p>
+                  </a:txBody>
+                  <a:tcPr/>
+                </a:tc>
+                <a:extLst>
+                  <a:ext uri="{0D108BD9-81ED-4DB2-BD59-A6C34878D82A}">
+                    <a16:rowId xmlns:a16="http://schemas.microsoft.com/office/drawing/2014/main" val="2633555765"/>
+                  </a:ext>
+                </a:extLst>
+              </a:tr>
+              <a:tr h="0">
+                <a:tc>
+                  <a:txBody>
+                    <a:bodyPr/>
+                    <a:lstStyle/>
+                    <a:p>
+                      <a:endParaRPr lang="en-US" sz="1200" dirty="0"/>
+                    </a:p>
+                  </a:txBody>
+                  <a:tcPr/>
+                </a:tc>
+                <a:tc>
+                  <a:txBody>
+                    <a:bodyPr/>
+                    <a:lstStyle/>
+                    <a:p>
+                      <a:endParaRPr lang="en-US" sz="1200" dirty="0"/>
+                    </a:p>
+                  </a:txBody>
+                  <a:tcPr/>
+                </a:tc>
+                <a:extLst>
+                  <a:ext uri="{0D108BD9-81ED-4DB2-BD59-A6C34878D82A}">
+                    <a16:rowId xmlns:a16="http://schemas.microsoft.com/office/drawing/2014/main" val="2628547942"/>
+                  </a:ext>
+                </a:extLst>
+              </a:tr>
+              <a:tr h="0">
+                <a:tc>
+                  <a:txBody>
+                    <a:bodyPr/>
+                    <a:lstStyle/>
+                    <a:p>
+                      <a:endParaRPr lang="en-US" sz="1200" dirty="0"/>
+                    </a:p>
+                  </a:txBody>
+                  <a:tcPr/>
+                </a:tc>
+                <a:tc>
+                  <a:txBody>
+                    <a:bodyPr/>
+                    <a:lstStyle/>
+                    <a:p>
+                      <a:endParaRPr lang="en-US" sz="1200" dirty="0"/>
+                    </a:p>
+                  </a:txBody>
+                  <a:tcPr/>
+                </a:tc>
+                <a:extLst>
+                  <a:ext uri="{0D108BD9-81ED-4DB2-BD59-A6C34878D82A}">
+                    <a16:rowId xmlns:a16="http://schemas.microsoft.com/office/drawing/2014/main" val="2514792747"/>
+                  </a:ext>
+                </a:extLst>
+              </a:tr>
+            </a:tbl>
+          </a:graphicData>
+        </a:graphic>
+      </p:graphicFrame>
+      <p:grpSp>
+        <p:nvGrpSpPr>
+          <p:cNvPr id="69" name="Group 68">
+            <a:extLst>
+              <a:ext uri="{FF2B5EF4-FFF2-40B4-BE49-F238E27FC236}">
+                <a16:creationId xmlns:a16="http://schemas.microsoft.com/office/drawing/2014/main" id="{D0567023-7018-00FD-AEBB-51DBF8779FAC}"/>
+              </a:ext>
+            </a:extLst>
+          </p:cNvPr>
+          <p:cNvGrpSpPr/>
+          <p:nvPr/>
+        </p:nvGrpSpPr>
+        <p:grpSpPr>
+          <a:xfrm>
+            <a:off x="2049950" y="1969564"/>
+            <a:ext cx="3213632" cy="315481"/>
+            <a:chOff x="1517115" y="2725514"/>
+            <a:chExt cx="3213632" cy="315481"/>
+          </a:xfrm>
+        </p:grpSpPr>
+        <p:sp>
+          <p:nvSpPr>
+            <p:cNvPr id="50" name="TextBox 49">
+              <a:extLst>
+                <a:ext uri="{FF2B5EF4-FFF2-40B4-BE49-F238E27FC236}">
+                  <a16:creationId xmlns:a16="http://schemas.microsoft.com/office/drawing/2014/main" id="{46F969DA-B8C9-7D7A-3AF4-FFFFE9D1473D}"/>
+                </a:ext>
+              </a:extLst>
+            </p:cNvPr>
+            <p:cNvSpPr txBox="1"/>
+            <p:nvPr/>
+          </p:nvSpPr>
+          <p:spPr>
+            <a:xfrm>
+              <a:off x="1517115" y="2725514"/>
+              <a:ext cx="1408904" cy="307777"/>
+            </a:xfrm>
+            <a:prstGeom prst="rect">
+              <a:avLst/>
+            </a:prstGeom>
+            <a:noFill/>
+          </p:spPr>
+          <p:txBody>
+            <a:bodyPr wrap="square" rtlCol="0">
+              <a:spAutoFit/>
+            </a:bodyPr>
+            <a:lstStyle/>
+            <a:p>
+              <a:pPr algn="r"/>
+              <a:r>
+                <a:rPr lang="en-US" sz="1400" dirty="0"/>
+                <a:t>Kit Category:</a:t>
+              </a:r>
+            </a:p>
+          </p:txBody>
+        </p:sp>
+        <p:sp>
+          <p:nvSpPr>
+            <p:cNvPr id="60" name="TextBox 59">
+              <a:extLst>
+                <a:ext uri="{FF2B5EF4-FFF2-40B4-BE49-F238E27FC236}">
+                  <a16:creationId xmlns:a16="http://schemas.microsoft.com/office/drawing/2014/main" id="{CDDB0233-6D71-4A4F-A63E-4B28CB92863A}"/>
+                </a:ext>
+              </a:extLst>
+            </p:cNvPr>
+            <p:cNvSpPr txBox="1"/>
+            <p:nvPr/>
+          </p:nvSpPr>
+          <p:spPr>
+            <a:xfrm>
+              <a:off x="2883000" y="2725514"/>
+              <a:ext cx="1847747" cy="307777"/>
+            </a:xfrm>
+            <a:prstGeom prst="rect">
+              <a:avLst/>
+            </a:prstGeom>
+            <a:noFill/>
+            <a:ln>
+              <a:solidFill>
+                <a:schemeClr val="accent1">
+                  <a:shade val="15000"/>
+                </a:schemeClr>
+              </a:solidFill>
+            </a:ln>
+          </p:spPr>
+          <p:txBody>
+            <a:bodyPr wrap="square" rtlCol="0">
+              <a:spAutoFit/>
+            </a:bodyPr>
+            <a:lstStyle/>
+            <a:p>
+              <a:r>
+                <a:rPr lang="en-US" sz="1400" dirty="0"/>
+                <a:t>All</a:t>
+              </a:r>
+            </a:p>
+          </p:txBody>
+        </p:sp>
+        <p:sp>
+          <p:nvSpPr>
+            <p:cNvPr id="62" name="Triangle 61">
+              <a:extLst>
+                <a:ext uri="{FF2B5EF4-FFF2-40B4-BE49-F238E27FC236}">
+                  <a16:creationId xmlns:a16="http://schemas.microsoft.com/office/drawing/2014/main" id="{24E52747-022D-F6C4-64D6-3A8496D82191}"/>
+                </a:ext>
+              </a:extLst>
+            </p:cNvPr>
+            <p:cNvSpPr/>
+            <p:nvPr/>
+          </p:nvSpPr>
+          <p:spPr>
+            <a:xfrm>
+              <a:off x="4465659" y="2746476"/>
+              <a:ext cx="234529" cy="79752"/>
+            </a:xfrm>
+            <a:prstGeom prst="triangle">
+              <a:avLst/>
+            </a:prstGeom>
+          </p:spPr>
+          <p:style>
+            <a:lnRef idx="2">
+              <a:schemeClr val="accent1">
+                <a:shade val="15000"/>
+              </a:schemeClr>
+            </a:lnRef>
+            <a:fillRef idx="1">
+              <a:schemeClr val="accent1"/>
+            </a:fillRef>
+            <a:effectRef idx="0">
+              <a:schemeClr val="accent1"/>
+            </a:effectRef>
+            <a:fontRef idx="minor">
+              <a:schemeClr val="lt1"/>
+            </a:fontRef>
+          </p:style>
+          <p:txBody>
+            <a:bodyPr rtlCol="0" anchor="ctr"/>
+            <a:lstStyle/>
+            <a:p>
+              <a:pPr algn="ctr"/>
+              <a:endParaRPr lang="en-US"/>
+            </a:p>
+          </p:txBody>
+        </p:sp>
+        <p:sp>
+          <p:nvSpPr>
+            <p:cNvPr id="65" name="Triangle 64">
+              <a:extLst>
+                <a:ext uri="{FF2B5EF4-FFF2-40B4-BE49-F238E27FC236}">
+                  <a16:creationId xmlns:a16="http://schemas.microsoft.com/office/drawing/2014/main" id="{4F233363-84FF-21DE-75D2-5357C86C8DDA}"/>
+                </a:ext>
+              </a:extLst>
+            </p:cNvPr>
+            <p:cNvSpPr/>
+            <p:nvPr/>
+          </p:nvSpPr>
+          <p:spPr>
+            <a:xfrm flipV="1">
+              <a:off x="4463153" y="2931505"/>
+              <a:ext cx="234529" cy="79752"/>
+            </a:xfrm>
+            <a:prstGeom prst="triangle">
+              <a:avLst/>
+            </a:prstGeom>
+          </p:spPr>
+          <p:style>
+            <a:lnRef idx="2">
+              <a:schemeClr val="accent1">
+                <a:shade val="15000"/>
+              </a:schemeClr>
+            </a:lnRef>
+            <a:fillRef idx="1">
+              <a:schemeClr val="accent1"/>
+            </a:fillRef>
+            <a:effectRef idx="0">
+              <a:schemeClr val="accent1"/>
+            </a:effectRef>
+            <a:fontRef idx="minor">
+              <a:schemeClr val="lt1"/>
+            </a:fontRef>
+          </p:style>
+          <p:txBody>
+            <a:bodyPr rtlCol="0" anchor="ctr"/>
+            <a:lstStyle/>
+            <a:p>
+              <a:pPr algn="ctr"/>
+              <a:endParaRPr lang="en-US"/>
+            </a:p>
+          </p:txBody>
+        </p:sp>
+        <p:sp>
+          <p:nvSpPr>
+            <p:cNvPr id="68" name="Rectangle 67">
+              <a:extLst>
+                <a:ext uri="{FF2B5EF4-FFF2-40B4-BE49-F238E27FC236}">
+                  <a16:creationId xmlns:a16="http://schemas.microsoft.com/office/drawing/2014/main" id="{1060D416-51D3-7C72-9257-E9236CDE913F}"/>
+                </a:ext>
+              </a:extLst>
+            </p:cNvPr>
+            <p:cNvSpPr/>
+            <p:nvPr/>
+          </p:nvSpPr>
+          <p:spPr>
+            <a:xfrm>
+              <a:off x="4463153" y="2733218"/>
+              <a:ext cx="254140" cy="307777"/>
+            </a:xfrm>
+            <a:prstGeom prst="rect">
+              <a:avLst/>
+            </a:prstGeom>
+            <a:solidFill>
+              <a:schemeClr val="accent1">
+                <a:alpha val="25000"/>
+              </a:schemeClr>
+            </a:solidFill>
+          </p:spPr>
+          <p:style>
+            <a:lnRef idx="2">
+              <a:schemeClr val="accent1">
+                <a:shade val="15000"/>
+              </a:schemeClr>
+            </a:lnRef>
+            <a:fillRef idx="1">
+              <a:schemeClr val="accent1"/>
+            </a:fillRef>
+            <a:effectRef idx="0">
+              <a:schemeClr val="accent1"/>
+            </a:effectRef>
+            <a:fontRef idx="minor">
+              <a:schemeClr val="lt1"/>
+            </a:fontRef>
+          </p:style>
+          <p:txBody>
+            <a:bodyPr rtlCol="0" anchor="ctr"/>
+            <a:lstStyle/>
+            <a:p>
+              <a:pPr algn="ctr"/>
+              <a:endParaRPr lang="en-US"/>
+            </a:p>
+          </p:txBody>
+        </p:sp>
+      </p:grpSp>
+      <p:grpSp>
+        <p:nvGrpSpPr>
+          <p:cNvPr id="78" name="Group 77">
+            <a:extLst>
+              <a:ext uri="{FF2B5EF4-FFF2-40B4-BE49-F238E27FC236}">
+                <a16:creationId xmlns:a16="http://schemas.microsoft.com/office/drawing/2014/main" id="{129ADEA4-B90C-DBF6-7176-E25649C386DD}"/>
+              </a:ext>
+            </a:extLst>
+          </p:cNvPr>
+          <p:cNvGrpSpPr/>
+          <p:nvPr/>
+        </p:nvGrpSpPr>
+        <p:grpSpPr>
+          <a:xfrm>
+            <a:off x="2722482" y="2371975"/>
+            <a:ext cx="2998588" cy="279837"/>
+            <a:chOff x="3951591" y="6391877"/>
+            <a:chExt cx="2998588" cy="279837"/>
+          </a:xfrm>
+        </p:grpSpPr>
+        <p:sp>
+          <p:nvSpPr>
+            <p:cNvPr id="15" name="Rectangle 14">
+              <a:extLst>
+                <a:ext uri="{FF2B5EF4-FFF2-40B4-BE49-F238E27FC236}">
+                  <a16:creationId xmlns:a16="http://schemas.microsoft.com/office/drawing/2014/main" id="{EEF80D2D-FBEB-F34F-5B03-A6650AA90F4A}"/>
+                </a:ext>
+              </a:extLst>
+            </p:cNvPr>
+            <p:cNvSpPr/>
+            <p:nvPr/>
+          </p:nvSpPr>
+          <p:spPr>
+            <a:xfrm>
+              <a:off x="4198451" y="6401416"/>
+              <a:ext cx="566971" cy="270298"/>
+            </a:xfrm>
+            <a:prstGeom prst="rect">
+              <a:avLst/>
+            </a:prstGeom>
+            <a:solidFill>
+              <a:schemeClr val="bg1"/>
+            </a:solidFill>
+            <a:ln>
+              <a:noFill/>
+            </a:ln>
+          </p:spPr>
+          <p:style>
+            <a:lnRef idx="2">
+              <a:schemeClr val="accent1">
+                <a:shade val="15000"/>
+              </a:schemeClr>
+            </a:lnRef>
+            <a:fillRef idx="1">
+              <a:schemeClr val="accent1"/>
+            </a:fillRef>
+            <a:effectRef idx="0">
+              <a:schemeClr val="accent1"/>
+            </a:effectRef>
+            <a:fontRef idx="minor">
+              <a:schemeClr val="lt1"/>
+            </a:fontRef>
+          </p:style>
+          <p:txBody>
+            <a:bodyPr rtlCol="0" anchor="ctr"/>
+            <a:lstStyle/>
+            <a:p>
+              <a:r>
+                <a:rPr lang="en-US" sz="1400" dirty="0">
+                  <a:solidFill>
+                    <a:schemeClr val="tx1"/>
+                  </a:solidFill>
+                </a:rPr>
+                <a:t>title</a:t>
+              </a:r>
+            </a:p>
+          </p:txBody>
+        </p:sp>
+        <p:sp>
+          <p:nvSpPr>
+            <p:cNvPr id="23" name="Rectangle 22">
+              <a:extLst>
+                <a:ext uri="{FF2B5EF4-FFF2-40B4-BE49-F238E27FC236}">
+                  <a16:creationId xmlns:a16="http://schemas.microsoft.com/office/drawing/2014/main" id="{2D2797BC-0FB7-3199-6C3D-8E646355E7EA}"/>
+                </a:ext>
+              </a:extLst>
+            </p:cNvPr>
+            <p:cNvSpPr/>
+            <p:nvPr/>
+          </p:nvSpPr>
+          <p:spPr>
+            <a:xfrm>
+              <a:off x="5175610" y="6401416"/>
+              <a:ext cx="786393" cy="270298"/>
+            </a:xfrm>
+            <a:prstGeom prst="rect">
+              <a:avLst/>
+            </a:prstGeom>
+            <a:solidFill>
+              <a:schemeClr val="bg1"/>
+            </a:solidFill>
+            <a:ln>
+              <a:noFill/>
+            </a:ln>
+          </p:spPr>
+          <p:style>
+            <a:lnRef idx="2">
+              <a:schemeClr val="accent1">
+                <a:shade val="15000"/>
+              </a:schemeClr>
+            </a:lnRef>
+            <a:fillRef idx="1">
+              <a:schemeClr val="accent1"/>
+            </a:fillRef>
+            <a:effectRef idx="0">
+              <a:schemeClr val="accent1"/>
+            </a:effectRef>
+            <a:fontRef idx="minor">
+              <a:schemeClr val="lt1"/>
+            </a:fontRef>
+          </p:style>
+          <p:txBody>
+            <a:bodyPr rtlCol="0" anchor="ctr"/>
+            <a:lstStyle/>
+            <a:p>
+              <a:r>
+                <a:rPr lang="en-US" sz="1400" dirty="0">
+                  <a:solidFill>
+                    <a:schemeClr val="tx1"/>
+                  </a:solidFill>
+                </a:rPr>
+                <a:t>author</a:t>
+              </a:r>
+            </a:p>
+          </p:txBody>
+        </p:sp>
+        <p:sp>
+          <p:nvSpPr>
+            <p:cNvPr id="28" name="Rectangle 27">
+              <a:extLst>
+                <a:ext uri="{FF2B5EF4-FFF2-40B4-BE49-F238E27FC236}">
+                  <a16:creationId xmlns:a16="http://schemas.microsoft.com/office/drawing/2014/main" id="{2EBA7C18-C700-754A-69DA-9B3F3492498A}"/>
+                </a:ext>
+              </a:extLst>
+            </p:cNvPr>
+            <p:cNvSpPr/>
+            <p:nvPr/>
+          </p:nvSpPr>
+          <p:spPr>
+            <a:xfrm>
+              <a:off x="6163786" y="6391877"/>
+              <a:ext cx="786393" cy="270298"/>
+            </a:xfrm>
+            <a:prstGeom prst="rect">
+              <a:avLst/>
+            </a:prstGeom>
+            <a:solidFill>
+              <a:schemeClr val="bg1"/>
+            </a:solidFill>
+            <a:ln>
+              <a:noFill/>
+            </a:ln>
+          </p:spPr>
+          <p:style>
+            <a:lnRef idx="2">
+              <a:schemeClr val="accent1">
+                <a:shade val="15000"/>
+              </a:schemeClr>
+            </a:lnRef>
+            <a:fillRef idx="1">
+              <a:schemeClr val="accent1"/>
+            </a:fillRef>
+            <a:effectRef idx="0">
+              <a:schemeClr val="accent1"/>
+            </a:effectRef>
+            <a:fontRef idx="minor">
+              <a:schemeClr val="lt1"/>
+            </a:fontRef>
+          </p:style>
+          <p:txBody>
+            <a:bodyPr rtlCol="0" anchor="ctr"/>
+            <a:lstStyle/>
+            <a:p>
+              <a:r>
+                <a:rPr lang="en-US" sz="1400" dirty="0">
+                  <a:solidFill>
+                    <a:schemeClr val="tx1"/>
+                  </a:solidFill>
+                </a:rPr>
+                <a:t>tags</a:t>
+              </a:r>
+            </a:p>
+          </p:txBody>
+        </p:sp>
+        <p:grpSp>
+          <p:nvGrpSpPr>
+            <p:cNvPr id="29" name="Group 28">
+              <a:extLst>
+                <a:ext uri="{FF2B5EF4-FFF2-40B4-BE49-F238E27FC236}">
+                  <a16:creationId xmlns:a16="http://schemas.microsoft.com/office/drawing/2014/main" id="{6A0E9552-A008-7E79-9336-2E81CE5B17C7}"/>
+                </a:ext>
+              </a:extLst>
+            </p:cNvPr>
+            <p:cNvGrpSpPr/>
+            <p:nvPr/>
+          </p:nvGrpSpPr>
+          <p:grpSpPr>
+            <a:xfrm>
+              <a:off x="5963156" y="6427980"/>
+              <a:ext cx="200630" cy="198092"/>
+              <a:chOff x="7262192" y="2933414"/>
+              <a:chExt cx="281608" cy="277324"/>
+            </a:xfrm>
+          </p:grpSpPr>
+          <p:sp>
+            <p:nvSpPr>
+              <p:cNvPr id="30" name="Rectangle 29">
+                <a:extLst>
+                  <a:ext uri="{FF2B5EF4-FFF2-40B4-BE49-F238E27FC236}">
+                    <a16:creationId xmlns:a16="http://schemas.microsoft.com/office/drawing/2014/main" id="{B12F2EC4-C675-3907-1306-61D056286258}"/>
+                  </a:ext>
+                </a:extLst>
+              </p:cNvPr>
+              <p:cNvSpPr/>
+              <p:nvPr/>
+            </p:nvSpPr>
+            <p:spPr>
+              <a:xfrm>
+                <a:off x="7262193" y="2933414"/>
+                <a:ext cx="281607" cy="274982"/>
+              </a:xfrm>
+              <a:prstGeom prst="rect">
+                <a:avLst/>
+              </a:prstGeom>
+              <a:solidFill>
+                <a:schemeClr val="bg1"/>
+              </a:solidFill>
+            </p:spPr>
+            <p:style>
+              <a:lnRef idx="2">
+                <a:schemeClr val="accent1">
+                  <a:shade val="15000"/>
+                </a:schemeClr>
+              </a:lnRef>
+              <a:fillRef idx="1">
+                <a:schemeClr val="accent1"/>
+              </a:fillRef>
+              <a:effectRef idx="0">
+                <a:schemeClr val="accent1"/>
+              </a:effectRef>
+              <a:fontRef idx="minor">
+                <a:schemeClr val="lt1"/>
+              </a:fontRef>
+            </p:style>
+            <p:txBody>
+              <a:bodyPr rtlCol="0" anchor="ctr"/>
+              <a:lstStyle/>
+              <a:p>
+                <a:pPr algn="ctr"/>
+                <a:endParaRPr lang="en-US" sz="1400" dirty="0">
+                  <a:solidFill>
+                    <a:schemeClr val="tx1"/>
+                  </a:solidFill>
+                </a:endParaRPr>
+              </a:p>
+            </p:txBody>
+          </p:sp>
+          <p:cxnSp>
+            <p:nvCxnSpPr>
+              <p:cNvPr id="31" name="Straight Connector 30">
+                <a:extLst>
+                  <a:ext uri="{FF2B5EF4-FFF2-40B4-BE49-F238E27FC236}">
+                    <a16:creationId xmlns:a16="http://schemas.microsoft.com/office/drawing/2014/main" id="{F9A47448-010C-633C-6A7A-1237A69E7FCC}"/>
+                  </a:ext>
+                </a:extLst>
+              </p:cNvPr>
+              <p:cNvCxnSpPr/>
+              <p:nvPr/>
+            </p:nvCxnSpPr>
+            <p:spPr>
+              <a:xfrm>
+                <a:off x="7262193" y="2933414"/>
+                <a:ext cx="281607" cy="270298"/>
+              </a:xfrm>
+              <a:prstGeom prst="line">
+                <a:avLst/>
+              </a:prstGeom>
+            </p:spPr>
+            <p:style>
+              <a:lnRef idx="1">
+                <a:schemeClr val="accent1"/>
+              </a:lnRef>
+              <a:fillRef idx="0">
+                <a:schemeClr val="accent1"/>
+              </a:fillRef>
+              <a:effectRef idx="0">
+                <a:schemeClr val="accent1"/>
+              </a:effectRef>
+              <a:fontRef idx="minor">
+                <a:schemeClr val="tx1"/>
+              </a:fontRef>
+            </p:style>
+          </p:cxnSp>
+          <p:cxnSp>
+            <p:nvCxnSpPr>
+              <p:cNvPr id="32" name="Straight Connector 31">
+                <a:extLst>
+                  <a:ext uri="{FF2B5EF4-FFF2-40B4-BE49-F238E27FC236}">
+                    <a16:creationId xmlns:a16="http://schemas.microsoft.com/office/drawing/2014/main" id="{8012A694-2214-EA80-E7BB-53F96393039E}"/>
+                  </a:ext>
+                </a:extLst>
+              </p:cNvPr>
+              <p:cNvCxnSpPr>
+                <a:cxnSpLocks/>
+              </p:cNvCxnSpPr>
+              <p:nvPr/>
+            </p:nvCxnSpPr>
+            <p:spPr>
+              <a:xfrm flipH="1">
+                <a:off x="7262192" y="2940440"/>
+                <a:ext cx="281607" cy="270298"/>
+              </a:xfrm>
+              <a:prstGeom prst="line">
+                <a:avLst/>
+              </a:prstGeom>
+            </p:spPr>
+            <p:style>
+              <a:lnRef idx="1">
+                <a:schemeClr val="accent1"/>
+              </a:lnRef>
+              <a:fillRef idx="0">
+                <a:schemeClr val="accent1"/>
+              </a:fillRef>
+              <a:effectRef idx="0">
+                <a:schemeClr val="accent1"/>
+              </a:effectRef>
+              <a:fontRef idx="minor">
+                <a:schemeClr val="tx1"/>
+              </a:fontRef>
+            </p:style>
+          </p:cxnSp>
+        </p:grpSp>
+        <p:grpSp>
+          <p:nvGrpSpPr>
+            <p:cNvPr id="70" name="Group 69">
+              <a:extLst>
+                <a:ext uri="{FF2B5EF4-FFF2-40B4-BE49-F238E27FC236}">
+                  <a16:creationId xmlns:a16="http://schemas.microsoft.com/office/drawing/2014/main" id="{DBBFBC0A-C666-E470-FD1F-3C94EA11954D}"/>
+                </a:ext>
+              </a:extLst>
+            </p:cNvPr>
+            <p:cNvGrpSpPr/>
+            <p:nvPr/>
+          </p:nvGrpSpPr>
+          <p:grpSpPr>
+            <a:xfrm>
+              <a:off x="4956188" y="6425470"/>
+              <a:ext cx="200630" cy="198092"/>
+              <a:chOff x="7262192" y="2933414"/>
+              <a:chExt cx="281608" cy="277324"/>
+            </a:xfrm>
+          </p:grpSpPr>
+          <p:sp>
+            <p:nvSpPr>
+              <p:cNvPr id="71" name="Rectangle 70">
+                <a:extLst>
+                  <a:ext uri="{FF2B5EF4-FFF2-40B4-BE49-F238E27FC236}">
+                    <a16:creationId xmlns:a16="http://schemas.microsoft.com/office/drawing/2014/main" id="{C3505B2C-31AE-9ECB-A17C-D1D8F7C912DD}"/>
+                  </a:ext>
+                </a:extLst>
+              </p:cNvPr>
+              <p:cNvSpPr/>
+              <p:nvPr/>
+            </p:nvSpPr>
+            <p:spPr>
+              <a:xfrm>
+                <a:off x="7262193" y="2933414"/>
+                <a:ext cx="281607" cy="274982"/>
+              </a:xfrm>
+              <a:prstGeom prst="rect">
+                <a:avLst/>
+              </a:prstGeom>
+              <a:solidFill>
+                <a:schemeClr val="bg1"/>
+              </a:solidFill>
+            </p:spPr>
+            <p:style>
+              <a:lnRef idx="2">
+                <a:schemeClr val="accent1">
+                  <a:shade val="15000"/>
+                </a:schemeClr>
+              </a:lnRef>
+              <a:fillRef idx="1">
+                <a:schemeClr val="accent1"/>
+              </a:fillRef>
+              <a:effectRef idx="0">
+                <a:schemeClr val="accent1"/>
+              </a:effectRef>
+              <a:fontRef idx="minor">
+                <a:schemeClr val="lt1"/>
+              </a:fontRef>
+            </p:style>
+            <p:txBody>
+              <a:bodyPr rtlCol="0" anchor="ctr"/>
+              <a:lstStyle/>
+              <a:p>
+                <a:pPr algn="ctr"/>
+                <a:endParaRPr lang="en-US" sz="1400" dirty="0">
+                  <a:solidFill>
+                    <a:schemeClr val="tx1"/>
+                  </a:solidFill>
+                </a:endParaRPr>
+              </a:p>
+            </p:txBody>
+          </p:sp>
+          <p:cxnSp>
+            <p:nvCxnSpPr>
+              <p:cNvPr id="72" name="Straight Connector 71">
+                <a:extLst>
+                  <a:ext uri="{FF2B5EF4-FFF2-40B4-BE49-F238E27FC236}">
+                    <a16:creationId xmlns:a16="http://schemas.microsoft.com/office/drawing/2014/main" id="{86C40474-B7F2-CE51-1BCB-67798284DD66}"/>
+                  </a:ext>
+                </a:extLst>
+              </p:cNvPr>
+              <p:cNvCxnSpPr/>
+              <p:nvPr/>
+            </p:nvCxnSpPr>
+            <p:spPr>
+              <a:xfrm>
+                <a:off x="7262193" y="2933414"/>
+                <a:ext cx="281607" cy="270298"/>
+              </a:xfrm>
+              <a:prstGeom prst="line">
+                <a:avLst/>
+              </a:prstGeom>
+            </p:spPr>
+            <p:style>
+              <a:lnRef idx="1">
+                <a:schemeClr val="accent1"/>
+              </a:lnRef>
+              <a:fillRef idx="0">
+                <a:schemeClr val="accent1"/>
+              </a:fillRef>
+              <a:effectRef idx="0">
+                <a:schemeClr val="accent1"/>
+              </a:effectRef>
+              <a:fontRef idx="minor">
+                <a:schemeClr val="tx1"/>
+              </a:fontRef>
+            </p:style>
+          </p:cxnSp>
+          <p:cxnSp>
+            <p:nvCxnSpPr>
+              <p:cNvPr id="73" name="Straight Connector 72">
+                <a:extLst>
+                  <a:ext uri="{FF2B5EF4-FFF2-40B4-BE49-F238E27FC236}">
+                    <a16:creationId xmlns:a16="http://schemas.microsoft.com/office/drawing/2014/main" id="{CADEE9FD-6343-E649-505A-2C829A4BD70B}"/>
+                  </a:ext>
+                </a:extLst>
+              </p:cNvPr>
+              <p:cNvCxnSpPr>
+                <a:cxnSpLocks/>
+              </p:cNvCxnSpPr>
+              <p:nvPr/>
+            </p:nvCxnSpPr>
+            <p:spPr>
+              <a:xfrm flipH="1">
+                <a:off x="7262192" y="2940440"/>
+                <a:ext cx="281607" cy="270298"/>
+              </a:xfrm>
+              <a:prstGeom prst="line">
+                <a:avLst/>
+              </a:prstGeom>
+            </p:spPr>
+            <p:style>
+              <a:lnRef idx="1">
+                <a:schemeClr val="accent1"/>
+              </a:lnRef>
+              <a:fillRef idx="0">
+                <a:schemeClr val="accent1"/>
+              </a:fillRef>
+              <a:effectRef idx="0">
+                <a:schemeClr val="accent1"/>
+              </a:effectRef>
+              <a:fontRef idx="minor">
+                <a:schemeClr val="tx1"/>
+              </a:fontRef>
+            </p:style>
+          </p:cxnSp>
+        </p:grpSp>
+        <p:grpSp>
+          <p:nvGrpSpPr>
+            <p:cNvPr id="74" name="Group 73">
+              <a:extLst>
+                <a:ext uri="{FF2B5EF4-FFF2-40B4-BE49-F238E27FC236}">
+                  <a16:creationId xmlns:a16="http://schemas.microsoft.com/office/drawing/2014/main" id="{AB394066-15FC-0669-FAD3-3405A3986CE7}"/>
+                </a:ext>
+              </a:extLst>
+            </p:cNvPr>
+            <p:cNvGrpSpPr/>
+            <p:nvPr/>
+          </p:nvGrpSpPr>
+          <p:grpSpPr>
+            <a:xfrm>
+              <a:off x="3951591" y="6420451"/>
+              <a:ext cx="200630" cy="198092"/>
+              <a:chOff x="7262192" y="2933414"/>
+              <a:chExt cx="281608" cy="277324"/>
+            </a:xfrm>
+          </p:grpSpPr>
+          <p:sp>
+            <p:nvSpPr>
+              <p:cNvPr id="75" name="Rectangle 74">
+                <a:extLst>
+                  <a:ext uri="{FF2B5EF4-FFF2-40B4-BE49-F238E27FC236}">
+                    <a16:creationId xmlns:a16="http://schemas.microsoft.com/office/drawing/2014/main" id="{5909D30D-48FA-2C0E-0017-F2F9ADC5262C}"/>
+                  </a:ext>
+                </a:extLst>
+              </p:cNvPr>
+              <p:cNvSpPr/>
+              <p:nvPr/>
+            </p:nvSpPr>
+            <p:spPr>
+              <a:xfrm>
+                <a:off x="7262193" y="2933414"/>
+                <a:ext cx="281607" cy="274982"/>
+              </a:xfrm>
+              <a:prstGeom prst="rect">
+                <a:avLst/>
+              </a:prstGeom>
+              <a:solidFill>
+                <a:schemeClr val="bg1"/>
+              </a:solidFill>
+            </p:spPr>
+            <p:style>
+              <a:lnRef idx="2">
+                <a:schemeClr val="accent1">
+                  <a:shade val="15000"/>
+                </a:schemeClr>
+              </a:lnRef>
+              <a:fillRef idx="1">
+                <a:schemeClr val="accent1"/>
+              </a:fillRef>
+              <a:effectRef idx="0">
+                <a:schemeClr val="accent1"/>
+              </a:effectRef>
+              <a:fontRef idx="minor">
+                <a:schemeClr val="lt1"/>
+              </a:fontRef>
+            </p:style>
+            <p:txBody>
+              <a:bodyPr rtlCol="0" anchor="ctr"/>
+              <a:lstStyle/>
+              <a:p>
+                <a:pPr algn="ctr"/>
+                <a:endParaRPr lang="en-US" sz="1400" dirty="0">
+                  <a:solidFill>
+                    <a:schemeClr val="tx1"/>
+                  </a:solidFill>
+                </a:endParaRPr>
+              </a:p>
+            </p:txBody>
+          </p:sp>
+          <p:cxnSp>
+            <p:nvCxnSpPr>
+              <p:cNvPr id="76" name="Straight Connector 75">
+                <a:extLst>
+                  <a:ext uri="{FF2B5EF4-FFF2-40B4-BE49-F238E27FC236}">
+                    <a16:creationId xmlns:a16="http://schemas.microsoft.com/office/drawing/2014/main" id="{B723D6FF-C44F-D3D1-BEBA-80A8538A5560}"/>
+                  </a:ext>
+                </a:extLst>
+              </p:cNvPr>
+              <p:cNvCxnSpPr/>
+              <p:nvPr/>
+            </p:nvCxnSpPr>
+            <p:spPr>
+              <a:xfrm>
+                <a:off x="7262193" y="2933414"/>
+                <a:ext cx="281607" cy="270298"/>
+              </a:xfrm>
+              <a:prstGeom prst="line">
+                <a:avLst/>
+              </a:prstGeom>
+            </p:spPr>
+            <p:style>
+              <a:lnRef idx="1">
+                <a:schemeClr val="accent1"/>
+              </a:lnRef>
+              <a:fillRef idx="0">
+                <a:schemeClr val="accent1"/>
+              </a:fillRef>
+              <a:effectRef idx="0">
+                <a:schemeClr val="accent1"/>
+              </a:effectRef>
+              <a:fontRef idx="minor">
+                <a:schemeClr val="tx1"/>
+              </a:fontRef>
+            </p:style>
+          </p:cxnSp>
+          <p:cxnSp>
+            <p:nvCxnSpPr>
+              <p:cNvPr id="77" name="Straight Connector 76">
+                <a:extLst>
+                  <a:ext uri="{FF2B5EF4-FFF2-40B4-BE49-F238E27FC236}">
+                    <a16:creationId xmlns:a16="http://schemas.microsoft.com/office/drawing/2014/main" id="{4B98C42B-673F-C5F6-D569-64B505D754AE}"/>
+                  </a:ext>
+                </a:extLst>
+              </p:cNvPr>
+              <p:cNvCxnSpPr>
+                <a:cxnSpLocks/>
+              </p:cNvCxnSpPr>
+              <p:nvPr/>
+            </p:nvCxnSpPr>
+            <p:spPr>
+              <a:xfrm flipH="1">
+                <a:off x="7262192" y="2940440"/>
+                <a:ext cx="281607" cy="270298"/>
+              </a:xfrm>
+              <a:prstGeom prst="line">
+                <a:avLst/>
+              </a:prstGeom>
+            </p:spPr>
+            <p:style>
+              <a:lnRef idx="1">
+                <a:schemeClr val="accent1"/>
+              </a:lnRef>
+              <a:fillRef idx="0">
+                <a:schemeClr val="accent1"/>
+              </a:fillRef>
+              <a:effectRef idx="0">
+                <a:schemeClr val="accent1"/>
+              </a:effectRef>
+              <a:fontRef idx="minor">
+                <a:schemeClr val="tx1"/>
+              </a:fontRef>
+            </p:style>
+          </p:cxnSp>
+        </p:grpSp>
+      </p:grpSp>
+    </p:spTree>
+    <p:extLst>
+      <p:ext uri="{BB962C8B-B14F-4D97-AF65-F5344CB8AC3E}">
+        <p14:creationId xmlns:p14="http://schemas.microsoft.com/office/powerpoint/2010/main" val="2237302716"/>
+      </p:ext>
+    </p:extLst>
+  </p:cSld>
+  <p:clrMapOvr>
+    <a:masterClrMapping/>
+  </p:clrMapOvr>
+</p:sld>
+</file>
+
 <file path=ppt/slides/slide2.xml><?xml version="1.0" encoding="utf-8"?>
 <p:sld xmlns:a="http://schemas.openxmlformats.org/drawingml/2006/main" xmlns:r="http://schemas.openxmlformats.org/officeDocument/2006/relationships" xmlns:p="http://schemas.openxmlformats.org/presentationml/2006/main">
   <p:cSld>
@@ -9348,13 +12099,7 @@
             <p:nvPr/>
           </p:nvPicPr>
           <p:blipFill>
-            <a:blip r:embed="rId3">
-              <a:extLst>
-                <a:ext uri="{96DAC541-7B7A-43D3-8B79-37D633B846F1}">
-                  <asvg:svgBlip xmlns:asvg="http://schemas.microsoft.com/office/drawing/2016/SVG/main"/>
-                </a:ext>
-              </a:extLst>
-            </a:blip>
+            <a:blip/>
             <a:stretch>
               <a:fillRect/>
             </a:stretch>
@@ -9440,13 +12185,7 @@
             <p:nvPr/>
           </p:nvPicPr>
           <p:blipFill>
-            <a:blip r:embed="rId3">
-              <a:extLst>
-                <a:ext uri="{96DAC541-7B7A-43D3-8B79-37D633B846F1}">
-                  <asvg:svgBlip xmlns:asvg="http://schemas.microsoft.com/office/drawing/2016/SVG/main"/>
-                </a:ext>
-              </a:extLst>
-            </a:blip>
+            <a:blip/>
             <a:stretch>
               <a:fillRect/>
             </a:stretch>

</xml_diff>